<commit_message>
Few mods to the Keras slides
</commit_message>
<xml_diff>
--- a/day1/3.Introduction to Keras.pptx
+++ b/day1/3.Introduction to Keras.pptx
@@ -5,7 +5,7 @@
     <p:sldMasterId id="2147483648" r:id="rId1"/>
   </p:sldMasterIdLst>
   <p:notesMasterIdLst>
-    <p:notesMasterId r:id="rId14"/>
+    <p:notesMasterId r:id="rId15"/>
   </p:notesMasterIdLst>
   <p:sldIdLst>
     <p:sldId id="256" r:id="rId2"/>
@@ -13,13 +13,14 @@
     <p:sldId id="296" r:id="rId4"/>
     <p:sldId id="311" r:id="rId5"/>
     <p:sldId id="298" r:id="rId6"/>
-    <p:sldId id="299" r:id="rId7"/>
-    <p:sldId id="300" r:id="rId8"/>
-    <p:sldId id="301" r:id="rId9"/>
-    <p:sldId id="309" r:id="rId10"/>
-    <p:sldId id="310" r:id="rId11"/>
-    <p:sldId id="303" r:id="rId12"/>
-    <p:sldId id="312" r:id="rId13"/>
+    <p:sldId id="1717" r:id="rId7"/>
+    <p:sldId id="299" r:id="rId8"/>
+    <p:sldId id="300" r:id="rId9"/>
+    <p:sldId id="301" r:id="rId10"/>
+    <p:sldId id="309" r:id="rId11"/>
+    <p:sldId id="310" r:id="rId12"/>
+    <p:sldId id="303" r:id="rId13"/>
+    <p:sldId id="312" r:id="rId14"/>
   </p:sldIdLst>
   <p:sldSz cx="12192000" cy="6858000"/>
   <p:notesSz cx="7010400" cy="9296400"/>
@@ -208,7 +209,7 @@
           <a:p>
             <a:fld id="{2FCFAD75-F7D8-9943-BCA9-418DB8BEA0FA}" type="datetimeFigureOut">
               <a:rPr lang="en-US" smtClean="0"/>
-              <a:t>2/19/2019</a:t>
+              <a:t>2/25/2019</a:t>
             </a:fld>
             <a:endParaRPr lang="en-US"/>
           </a:p>
@@ -633,7 +634,7 @@
     </p:spTree>
     <p:extLst>
       <p:ext uri="{BB962C8B-B14F-4D97-AF65-F5344CB8AC3E}">
-        <p14:creationId xmlns:p14="http://schemas.microsoft.com/office/powerpoint/2010/main" val="414184576"/>
+        <p14:creationId xmlns:p14="http://schemas.microsoft.com/office/powerpoint/2010/main" val="1928733245"/>
       </p:ext>
     </p:extLst>
   </p:cSld>
@@ -717,7 +718,7 @@
     </p:spTree>
     <p:extLst>
       <p:ext uri="{BB962C8B-B14F-4D97-AF65-F5344CB8AC3E}">
-        <p14:creationId xmlns:p14="http://schemas.microsoft.com/office/powerpoint/2010/main" val="1675399449"/>
+        <p14:creationId xmlns:p14="http://schemas.microsoft.com/office/powerpoint/2010/main" val="414184576"/>
       </p:ext>
     </p:extLst>
   </p:cSld>
@@ -793,6 +794,90 @@
             <a:fld id="{629C55F3-487F-A548-9A62-A30A51303F6D}" type="slidenum">
               <a:rPr lang="en-US" smtClean="0"/>
               <a:t>12</a:t>
+            </a:fld>
+            <a:endParaRPr lang="en-US"/>
+          </a:p>
+        </p:txBody>
+      </p:sp>
+    </p:spTree>
+    <p:extLst>
+      <p:ext uri="{BB962C8B-B14F-4D97-AF65-F5344CB8AC3E}">
+        <p14:creationId xmlns:p14="http://schemas.microsoft.com/office/powerpoint/2010/main" val="1675399449"/>
+      </p:ext>
+    </p:extLst>
+  </p:cSld>
+  <p:clrMapOvr>
+    <a:masterClrMapping/>
+  </p:clrMapOvr>
+</p:notes>
+</file>
+
+<file path=ppt/notesSlides/notesSlide13.xml><?xml version="1.0" encoding="utf-8"?>
+<p:notes xmlns:a="http://schemas.openxmlformats.org/drawingml/2006/main" xmlns:r="http://schemas.openxmlformats.org/officeDocument/2006/relationships" xmlns:p="http://schemas.openxmlformats.org/presentationml/2006/main">
+  <p:cSld>
+    <p:spTree>
+      <p:nvGrpSpPr>
+        <p:cNvPr id="1" name=""/>
+        <p:cNvGrpSpPr/>
+        <p:nvPr/>
+      </p:nvGrpSpPr>
+      <p:grpSpPr>
+        <a:xfrm>
+          <a:off x="0" y="0"/>
+          <a:ext cx="0" cy="0"/>
+          <a:chOff x="0" y="0"/>
+          <a:chExt cx="0" cy="0"/>
+        </a:xfrm>
+      </p:grpSpPr>
+      <p:sp>
+        <p:nvSpPr>
+          <p:cNvPr id="2" name="Slide Image Placeholder 1"/>
+          <p:cNvSpPr>
+            <a:spLocks noGrp="1" noRot="1" noChangeAspect="1"/>
+          </p:cNvSpPr>
+          <p:nvPr>
+            <p:ph type="sldImg"/>
+          </p:nvPr>
+        </p:nvSpPr>
+        <p:spPr/>
+      </p:sp>
+      <p:sp>
+        <p:nvSpPr>
+          <p:cNvPr id="3" name="Notes Placeholder 2"/>
+          <p:cNvSpPr>
+            <a:spLocks noGrp="1"/>
+          </p:cNvSpPr>
+          <p:nvPr>
+            <p:ph type="body" idx="1"/>
+          </p:nvPr>
+        </p:nvSpPr>
+        <p:spPr/>
+        <p:txBody>
+          <a:bodyPr/>
+          <a:lstStyle/>
+          <a:p>
+            <a:endParaRPr lang="en-US" dirty="0"/>
+          </a:p>
+        </p:txBody>
+      </p:sp>
+      <p:sp>
+        <p:nvSpPr>
+          <p:cNvPr id="4" name="Slide Number Placeholder 3"/>
+          <p:cNvSpPr>
+            <a:spLocks noGrp="1"/>
+          </p:cNvSpPr>
+          <p:nvPr>
+            <p:ph type="sldNum" sz="quarter" idx="10"/>
+          </p:nvPr>
+        </p:nvSpPr>
+        <p:spPr/>
+        <p:txBody>
+          <a:bodyPr/>
+          <a:lstStyle/>
+          <a:p>
+            <a:fld id="{629C55F3-487F-A548-9A62-A30A51303F6D}" type="slidenum">
+              <a:rPr lang="en-US" smtClean="0"/>
+              <a:t>13</a:t>
             </a:fld>
             <a:endParaRPr lang="en-US"/>
           </a:p>
@@ -1053,7 +1138,7 @@
     </p:spTree>
     <p:extLst>
       <p:ext uri="{BB962C8B-B14F-4D97-AF65-F5344CB8AC3E}">
-        <p14:creationId xmlns:p14="http://schemas.microsoft.com/office/powerpoint/2010/main" val="421063813"/>
+        <p14:creationId xmlns:p14="http://schemas.microsoft.com/office/powerpoint/2010/main" val="3499520827"/>
       </p:ext>
     </p:extLst>
   </p:cSld>
@@ -1202,7 +1287,7 @@
             <a:spLocks noGrp="1"/>
           </p:cNvSpPr>
           <p:nvPr>
-            <p:ph type="sldNum" sz="quarter" idx="10"/>
+            <p:ph type="sldNum" sz="quarter" idx="5"/>
           </p:nvPr>
         </p:nvSpPr>
         <p:spPr/>
@@ -1210,7 +1295,7 @@
           <a:bodyPr/>
           <a:lstStyle/>
           <a:p>
-            <a:fld id="{629C55F3-487F-A548-9A62-A30A51303F6D}" type="slidenum">
+            <a:fld id="{FDBDCDA1-F8E5-114F-BC88-ED24344FB9AF}" type="slidenum">
               <a:rPr lang="en-US" smtClean="0"/>
               <a:t>6</a:t>
             </a:fld>
@@ -1221,7 +1306,7 @@
     </p:spTree>
     <p:extLst>
       <p:ext uri="{BB962C8B-B14F-4D97-AF65-F5344CB8AC3E}">
-        <p14:creationId xmlns:p14="http://schemas.microsoft.com/office/powerpoint/2010/main" val="1802486657"/>
+        <p14:creationId xmlns:p14="http://schemas.microsoft.com/office/powerpoint/2010/main" val="1862343393"/>
       </p:ext>
     </p:extLst>
   </p:cSld>
@@ -1305,7 +1390,7 @@
     </p:spTree>
     <p:extLst>
       <p:ext uri="{BB962C8B-B14F-4D97-AF65-F5344CB8AC3E}">
-        <p14:creationId xmlns:p14="http://schemas.microsoft.com/office/powerpoint/2010/main" val="3262953829"/>
+        <p14:creationId xmlns:p14="http://schemas.microsoft.com/office/powerpoint/2010/main" val="1802486657"/>
       </p:ext>
     </p:extLst>
   </p:cSld>
@@ -1359,7 +1444,32 @@
           <a:bodyPr/>
           <a:lstStyle/>
           <a:p>
-            <a:endParaRPr lang="en-US" dirty="0"/>
+            <a:pPr marL="0" marR="0" lvl="0" indent="0" algn="l" defTabSz="914400" rtl="0" eaLnBrk="1" fontAlgn="auto" latinLnBrk="0" hangingPunct="1">
+              <a:lnSpc>
+                <a:spcPct val="100000"/>
+              </a:lnSpc>
+              <a:spcBef>
+                <a:spcPts val="0"/>
+              </a:spcBef>
+              <a:spcAft>
+                <a:spcPts val="0"/>
+              </a:spcAft>
+              <a:buClrTx/>
+              <a:buSzTx/>
+              <a:buFontTx/>
+              <a:buNone/>
+              <a:tabLst/>
+              <a:defRPr/>
+            </a:pPr>
+            <a:endParaRPr lang="en-US" sz="1200" b="0" i="0" u="none" strike="noStrike" kern="1200" dirty="0">
+              <a:solidFill>
+                <a:schemeClr val="tx1"/>
+              </a:solidFill>
+              <a:effectLst/>
+              <a:latin typeface="+mn-lt"/>
+              <a:ea typeface="+mn-ea"/>
+              <a:cs typeface="+mn-cs"/>
+            </a:endParaRPr>
           </a:p>
         </p:txBody>
       </p:sp>
@@ -1389,7 +1499,7 @@
     </p:spTree>
     <p:extLst>
       <p:ext uri="{BB962C8B-B14F-4D97-AF65-F5344CB8AC3E}">
-        <p14:creationId xmlns:p14="http://schemas.microsoft.com/office/powerpoint/2010/main" val="2960156874"/>
+        <p14:creationId xmlns:p14="http://schemas.microsoft.com/office/powerpoint/2010/main" val="3262953829"/>
       </p:ext>
     </p:extLst>
   </p:cSld>
@@ -1473,7 +1583,7 @@
     </p:spTree>
     <p:extLst>
       <p:ext uri="{BB962C8B-B14F-4D97-AF65-F5344CB8AC3E}">
-        <p14:creationId xmlns:p14="http://schemas.microsoft.com/office/powerpoint/2010/main" val="1928733245"/>
+        <p14:creationId xmlns:p14="http://schemas.microsoft.com/office/powerpoint/2010/main" val="2960156874"/>
       </p:ext>
     </p:extLst>
   </p:cSld>
@@ -1630,7 +1740,7 @@
           <a:p>
             <a:fld id="{01A33273-803F-DA43-96F2-E36DF0A1E10C}" type="datetimeFigureOut">
               <a:rPr lang="en-US" smtClean="0"/>
-              <a:t>2/19/2019</a:t>
+              <a:t>2/25/2019</a:t>
             </a:fld>
             <a:endParaRPr lang="en-US"/>
           </a:p>
@@ -1828,7 +1938,7 @@
           <a:p>
             <a:fld id="{01A33273-803F-DA43-96F2-E36DF0A1E10C}" type="datetimeFigureOut">
               <a:rPr lang="en-US" smtClean="0"/>
-              <a:t>2/19/2019</a:t>
+              <a:t>2/25/2019</a:t>
             </a:fld>
             <a:endParaRPr lang="en-US"/>
           </a:p>
@@ -2036,7 +2146,7 @@
           <a:p>
             <a:fld id="{01A33273-803F-DA43-96F2-E36DF0A1E10C}" type="datetimeFigureOut">
               <a:rPr lang="en-US" smtClean="0"/>
-              <a:t>2/19/2019</a:t>
+              <a:t>2/25/2019</a:t>
             </a:fld>
             <a:endParaRPr lang="en-US"/>
           </a:p>
@@ -2234,7 +2344,7 @@
           <a:p>
             <a:fld id="{01A33273-803F-DA43-96F2-E36DF0A1E10C}" type="datetimeFigureOut">
               <a:rPr lang="en-US" smtClean="0"/>
-              <a:t>2/19/2019</a:t>
+              <a:t>2/25/2019</a:t>
             </a:fld>
             <a:endParaRPr lang="en-US"/>
           </a:p>
@@ -2509,7 +2619,7 @@
           <a:p>
             <a:fld id="{01A33273-803F-DA43-96F2-E36DF0A1E10C}" type="datetimeFigureOut">
               <a:rPr lang="en-US" smtClean="0"/>
-              <a:t>2/19/2019</a:t>
+              <a:t>2/25/2019</a:t>
             </a:fld>
             <a:endParaRPr lang="en-US"/>
           </a:p>
@@ -2774,7 +2884,7 @@
           <a:p>
             <a:fld id="{01A33273-803F-DA43-96F2-E36DF0A1E10C}" type="datetimeFigureOut">
               <a:rPr lang="en-US" smtClean="0"/>
-              <a:t>2/19/2019</a:t>
+              <a:t>2/25/2019</a:t>
             </a:fld>
             <a:endParaRPr lang="en-US"/>
           </a:p>
@@ -3186,7 +3296,7 @@
           <a:p>
             <a:fld id="{01A33273-803F-DA43-96F2-E36DF0A1E10C}" type="datetimeFigureOut">
               <a:rPr lang="en-US" smtClean="0"/>
-              <a:t>2/19/2019</a:t>
+              <a:t>2/25/2019</a:t>
             </a:fld>
             <a:endParaRPr lang="en-US"/>
           </a:p>
@@ -3327,7 +3437,7 @@
           <a:p>
             <a:fld id="{01A33273-803F-DA43-96F2-E36DF0A1E10C}" type="datetimeFigureOut">
               <a:rPr lang="en-US" smtClean="0"/>
-              <a:t>2/19/2019</a:t>
+              <a:t>2/25/2019</a:t>
             </a:fld>
             <a:endParaRPr lang="en-US"/>
           </a:p>
@@ -3440,7 +3550,7 @@
           <a:p>
             <a:fld id="{01A33273-803F-DA43-96F2-E36DF0A1E10C}" type="datetimeFigureOut">
               <a:rPr lang="en-US" smtClean="0"/>
-              <a:t>2/19/2019</a:t>
+              <a:t>2/25/2019</a:t>
             </a:fld>
             <a:endParaRPr lang="en-US"/>
           </a:p>
@@ -3751,7 +3861,7 @@
           <a:p>
             <a:fld id="{01A33273-803F-DA43-96F2-E36DF0A1E10C}" type="datetimeFigureOut">
               <a:rPr lang="en-US" smtClean="0"/>
-              <a:t>2/19/2019</a:t>
+              <a:t>2/25/2019</a:t>
             </a:fld>
             <a:endParaRPr lang="en-US"/>
           </a:p>
@@ -4039,7 +4149,7 @@
           <a:p>
             <a:fld id="{01A33273-803F-DA43-96F2-E36DF0A1E10C}" type="datetimeFigureOut">
               <a:rPr lang="en-US" smtClean="0"/>
-              <a:t>2/19/2019</a:t>
+              <a:t>2/25/2019</a:t>
             </a:fld>
             <a:endParaRPr lang="en-US"/>
           </a:p>
@@ -4280,7 +4390,7 @@
           <a:p>
             <a:fld id="{01A33273-803F-DA43-96F2-E36DF0A1E10C}" type="datetimeFigureOut">
               <a:rPr lang="en-US" smtClean="0"/>
-              <a:t>2/19/2019</a:t>
+              <a:t>2/25/2019</a:t>
             </a:fld>
             <a:endParaRPr lang="en-US"/>
           </a:p>
@@ -5311,6 +5421,286 @@
                   <a:schemeClr val="accent1"/>
                 </a:solidFill>
               </a:rPr>
+              <a:t>Overfitting</a:t>
+            </a:r>
+          </a:p>
+        </p:txBody>
+      </p:sp>
+      <p:cxnSp>
+        <p:nvCxnSpPr>
+          <p:cNvPr id="10" name="Straight Connector 9">
+            <a:extLst>
+              <a:ext uri="{FF2B5EF4-FFF2-40B4-BE49-F238E27FC236}">
+                <a16:creationId xmlns:a16="http://schemas.microsoft.com/office/drawing/2014/main" id="{2D72A2C9-F3CA-4216-8BAD-FA4C970C3C4E}"/>
+              </a:ext>
+              <a:ext uri="{C183D7F6-B498-43B3-948B-1728B52AA6E4}">
+                <adec:decorative xmlns:adec="http://schemas.microsoft.com/office/drawing/2017/decorative" val="1"/>
+              </a:ext>
+            </a:extLst>
+          </p:cNvPr>
+          <p:cNvCxnSpPr>
+            <a:cxnSpLocks noGrp="1" noRot="1" noChangeAspect="1" noMove="1" noResize="1" noEditPoints="1" noAdjustHandles="1" noChangeArrowheads="1" noChangeShapeType="1"/>
+          </p:cNvCxnSpPr>
+          <p:nvPr>
+            <p:extLst>
+              <p:ext uri="{386F3935-93C4-4BCD-93E2-E3B085C9AB24}">
+                <p16:designElem xmlns:p16="http://schemas.microsoft.com/office/powerpoint/2015/main" val="1"/>
+              </p:ext>
+            </p:extLst>
+          </p:nvPr>
+        </p:nvCxnSpPr>
+        <p:spPr>
+          <a:xfrm>
+            <a:off x="4654296" y="2057400"/>
+            <a:ext cx="0" cy="2743200"/>
+          </a:xfrm>
+          <a:prstGeom prst="line">
+            <a:avLst/>
+          </a:prstGeom>
+          <a:ln w="19050">
+            <a:solidFill>
+              <a:schemeClr val="tx1">
+                <a:lumMod val="85000"/>
+                <a:lumOff val="15000"/>
+              </a:schemeClr>
+            </a:solidFill>
+          </a:ln>
+        </p:spPr>
+        <p:style>
+          <a:lnRef idx="1">
+            <a:schemeClr val="accent1"/>
+          </a:lnRef>
+          <a:fillRef idx="0">
+            <a:schemeClr val="accent1"/>
+          </a:fillRef>
+          <a:effectRef idx="0">
+            <a:schemeClr val="accent1"/>
+          </a:effectRef>
+          <a:fontRef idx="minor">
+            <a:schemeClr val="tx1"/>
+          </a:fontRef>
+        </p:style>
+      </p:cxnSp>
+      <p:pic>
+        <p:nvPicPr>
+          <p:cNvPr id="6" name="Picture 4" descr="Early Stopping">
+            <a:extLst>
+              <a:ext uri="{FF2B5EF4-FFF2-40B4-BE49-F238E27FC236}">
+                <a16:creationId xmlns:a16="http://schemas.microsoft.com/office/drawing/2014/main" id="{17B31C2E-CF72-4FFE-ABE8-05E550E6BC73}"/>
+              </a:ext>
+            </a:extLst>
+          </p:cNvPr>
+          <p:cNvPicPr>
+            <a:picLocks noChangeAspect="1" noChangeArrowheads="1"/>
+          </p:cNvPicPr>
+          <p:nvPr/>
+        </p:nvPicPr>
+        <p:blipFill>
+          <a:blip r:embed="rId3">
+            <a:extLst>
+              <a:ext uri="{28A0092B-C50C-407E-A947-70E740481C1C}">
+                <a14:useLocalDpi xmlns:a14="http://schemas.microsoft.com/office/drawing/2010/main" val="0"/>
+              </a:ext>
+            </a:extLst>
+          </a:blip>
+          <a:srcRect/>
+          <a:stretch>
+            <a:fillRect/>
+          </a:stretch>
+        </p:blipFill>
+        <p:spPr bwMode="auto">
+          <a:xfrm>
+            <a:off x="4985594" y="1213269"/>
+            <a:ext cx="6553545" cy="3686368"/>
+          </a:xfrm>
+          <a:prstGeom prst="rect">
+            <a:avLst/>
+          </a:prstGeom>
+          <a:noFill/>
+          <a:extLst>
+            <a:ext uri="{909E8E84-426E-40DD-AFC4-6F175D3DCCD1}">
+              <a14:hiddenFill xmlns:a14="http://schemas.microsoft.com/office/drawing/2010/main">
+                <a:solidFill>
+                  <a:srgbClr val="FFFFFF"/>
+                </a:solidFill>
+              </a14:hiddenFill>
+            </a:ext>
+          </a:extLst>
+        </p:spPr>
+      </p:pic>
+      <p:sp>
+        <p:nvSpPr>
+          <p:cNvPr id="9" name="TextBox 8">
+            <a:extLst>
+              <a:ext uri="{FF2B5EF4-FFF2-40B4-BE49-F238E27FC236}">
+                <a16:creationId xmlns:a16="http://schemas.microsoft.com/office/drawing/2014/main" id="{7D245E57-972B-4D27-89D9-EE9CF0C98ED7}"/>
+              </a:ext>
+            </a:extLst>
+          </p:cNvPr>
+          <p:cNvSpPr txBox="1"/>
+          <p:nvPr/>
+        </p:nvSpPr>
+        <p:spPr>
+          <a:xfrm>
+            <a:off x="6893546" y="4554379"/>
+            <a:ext cx="2236054" cy="246221"/>
+          </a:xfrm>
+          <a:prstGeom prst="rect">
+            <a:avLst/>
+          </a:prstGeom>
+          <a:noFill/>
+        </p:spPr>
+        <p:txBody>
+          <a:bodyPr wrap="square" rtlCol="0">
+            <a:spAutoFit/>
+          </a:bodyPr>
+          <a:lstStyle/>
+          <a:p>
+            <a:r>
+              <a:rPr lang="en-US" sz="1000" dirty="0"/>
+              <a:t>https://deeplearing4j.org/docs</a:t>
+            </a:r>
+          </a:p>
+        </p:txBody>
+      </p:sp>
+    </p:spTree>
+    <p:extLst>
+      <p:ext uri="{BB962C8B-B14F-4D97-AF65-F5344CB8AC3E}">
+        <p14:creationId xmlns:p14="http://schemas.microsoft.com/office/powerpoint/2010/main" val="918747676"/>
+      </p:ext>
+    </p:extLst>
+  </p:cSld>
+  <p:clrMapOvr>
+    <a:masterClrMapping/>
+  </p:clrMapOvr>
+</p:sld>
+</file>
+
+<file path=ppt/slides/slide11.xml><?xml version="1.0" encoding="utf-8"?>
+<p:sld xmlns:a="http://schemas.openxmlformats.org/drawingml/2006/main" xmlns:r="http://schemas.openxmlformats.org/officeDocument/2006/relationships" xmlns:p="http://schemas.openxmlformats.org/presentationml/2006/main">
+  <p:cSld>
+    <p:bg>
+      <p:bgPr>
+        <a:solidFill>
+          <a:schemeClr val="bg1"/>
+        </a:solidFill>
+        <a:effectLst/>
+      </p:bgPr>
+    </p:bg>
+    <p:spTree>
+      <p:nvGrpSpPr>
+        <p:cNvPr id="1" name=""/>
+        <p:cNvGrpSpPr/>
+        <p:nvPr/>
+      </p:nvGrpSpPr>
+      <p:grpSpPr>
+        <a:xfrm>
+          <a:off x="0" y="0"/>
+          <a:ext cx="0" cy="0"/>
+          <a:chOff x="0" y="0"/>
+          <a:chExt cx="0" cy="0"/>
+        </a:xfrm>
+      </p:grpSpPr>
+      <p:sp>
+        <p:nvSpPr>
+          <p:cNvPr id="8" name="Rectangle 7">
+            <a:extLst>
+              <a:ext uri="{FF2B5EF4-FFF2-40B4-BE49-F238E27FC236}">
+                <a16:creationId xmlns:a16="http://schemas.microsoft.com/office/drawing/2014/main" id="{8D70B121-56F4-4848-B38B-182089D909FA}"/>
+              </a:ext>
+              <a:ext uri="{C183D7F6-B498-43B3-948B-1728B52AA6E4}">
+                <adec:decorative xmlns:adec="http://schemas.microsoft.com/office/drawing/2017/decorative" val="1"/>
+              </a:ext>
+            </a:extLst>
+          </p:cNvPr>
+          <p:cNvSpPr>
+            <a:spLocks noGrp="1" noRot="1" noChangeAspect="1" noMove="1" noResize="1" noEditPoints="1" noAdjustHandles="1" noChangeArrowheads="1" noChangeShapeType="1" noTextEdit="1"/>
+          </p:cNvSpPr>
+          <p:nvPr>
+            <p:extLst>
+              <p:ext uri="{386F3935-93C4-4BCD-93E2-E3B085C9AB24}">
+                <p16:designElem xmlns:p16="http://schemas.microsoft.com/office/powerpoint/2015/main" val="1"/>
+              </p:ext>
+            </p:extLst>
+          </p:nvPr>
+        </p:nvSpPr>
+        <p:spPr bwMode="ltGray">
+          <a:xfrm>
+            <a:off x="321564" y="320040"/>
+            <a:ext cx="11548872" cy="6217920"/>
+          </a:xfrm>
+          <a:prstGeom prst="rect">
+            <a:avLst/>
+          </a:prstGeom>
+          <a:solidFill>
+            <a:schemeClr val="tx1">
+              <a:alpha val="8000"/>
+            </a:schemeClr>
+          </a:solidFill>
+          <a:ln w="127000" cap="sq" cmpd="thinThick">
+            <a:noFill/>
+          </a:ln>
+        </p:spPr>
+        <p:style>
+          <a:lnRef idx="2">
+            <a:schemeClr val="accent1">
+              <a:shade val="50000"/>
+            </a:schemeClr>
+          </a:lnRef>
+          <a:fillRef idx="1">
+            <a:schemeClr val="accent1"/>
+          </a:fillRef>
+          <a:effectRef idx="0">
+            <a:schemeClr val="accent1"/>
+          </a:effectRef>
+          <a:fontRef idx="minor">
+            <a:schemeClr val="lt1"/>
+          </a:fontRef>
+        </p:style>
+        <p:txBody>
+          <a:bodyPr rtlCol="0" anchor="ctr"/>
+          <a:lstStyle/>
+          <a:p>
+            <a:pPr algn="ctr"/>
+            <a:endParaRPr lang="en-US"/>
+          </a:p>
+        </p:txBody>
+      </p:sp>
+      <p:sp>
+        <p:nvSpPr>
+          <p:cNvPr id="2" name="Title 1">
+            <a:extLst>
+              <a:ext uri="{FF2B5EF4-FFF2-40B4-BE49-F238E27FC236}">
+                <a16:creationId xmlns:a16="http://schemas.microsoft.com/office/drawing/2014/main" id="{9523C2FF-6973-401D-AB3E-DA8C27FCDAE3}"/>
+              </a:ext>
+            </a:extLst>
+          </p:cNvPr>
+          <p:cNvSpPr>
+            <a:spLocks noGrp="1"/>
+          </p:cNvSpPr>
+          <p:nvPr>
+            <p:ph type="title"/>
+          </p:nvPr>
+        </p:nvSpPr>
+        <p:spPr>
+          <a:xfrm>
+            <a:off x="838200" y="320040"/>
+            <a:ext cx="3494362" cy="4930246"/>
+          </a:xfrm>
+        </p:spPr>
+        <p:txBody>
+          <a:bodyPr>
+            <a:normAutofit/>
+          </a:bodyPr>
+          <a:lstStyle/>
+          <a:p>
+            <a:pPr algn="r"/>
+            <a:r>
+              <a:rPr lang="en-US" dirty="0">
+                <a:solidFill>
+                  <a:schemeClr val="accent1"/>
+                </a:solidFill>
+              </a:rPr>
               <a:t>Techniques</a:t>
             </a:r>
           </a:p>
@@ -5467,8 +5857,8 @@
         </p:nvSpPr>
         <p:spPr>
           <a:xfrm>
-            <a:off x="4849198" y="4336192"/>
-            <a:ext cx="6801171" cy="1859535"/>
+            <a:off x="5510026" y="4923545"/>
+            <a:ext cx="6284966" cy="1395127"/>
           </a:xfrm>
           <a:prstGeom prst="rect">
             <a:avLst/>
@@ -5502,7 +5892,7 @@
                 <a:latin typeface="Calibri" panose="020F0502020204030204" pitchFamily="34" charset="0"/>
                 <a:cs typeface="Calibri" panose="020F0502020204030204" pitchFamily="34" charset="0"/>
               </a:rPr>
-              <a:t>early_stopping</a:t>
+              <a:t>model.add</a:t>
             </a:r>
             <a:r>
               <a:rPr lang="en-US" dirty="0">
@@ -5512,10 +5902,29 @@
                 <a:latin typeface="Calibri" panose="020F0502020204030204" pitchFamily="34" charset="0"/>
                 <a:cs typeface="Calibri" panose="020F0502020204030204" pitchFamily="34" charset="0"/>
               </a:rPr>
-              <a:t> = </a:t>
-            </a:r>
-          </a:p>
-          <a:p>
+              <a:t>(Dropout(.50)) </a:t>
+            </a:r>
+          </a:p>
+          <a:p>
+            <a:endParaRPr lang="en-US" dirty="0">
+              <a:solidFill>
+                <a:schemeClr val="bg1"/>
+              </a:solidFill>
+              <a:latin typeface="Calibri" panose="020F0502020204030204" pitchFamily="34" charset="0"/>
+              <a:cs typeface="Calibri" panose="020F0502020204030204" pitchFamily="34" charset="0"/>
+            </a:endParaRPr>
+          </a:p>
+          <a:p>
+            <a:r>
+              <a:rPr lang="en-US" dirty="0" err="1">
+                <a:solidFill>
+                  <a:schemeClr val="bg1"/>
+                </a:solidFill>
+                <a:latin typeface="Calibri" panose="020F0502020204030204" pitchFamily="34" charset="0"/>
+                <a:cs typeface="Calibri" panose="020F0502020204030204" pitchFamily="34" charset="0"/>
+              </a:rPr>
+              <a:t>model.fit</a:t>
+            </a:r>
             <a:r>
               <a:rPr lang="en-US" dirty="0">
                 <a:solidFill>
@@ -5524,7 +5933,79 @@
                 <a:latin typeface="Calibri" panose="020F0502020204030204" pitchFamily="34" charset="0"/>
                 <a:cs typeface="Calibri" panose="020F0502020204030204" pitchFamily="34" charset="0"/>
               </a:rPr>
-              <a:t>        </a:t>
+              <a:t>(</a:t>
+            </a:r>
+            <a:r>
+              <a:rPr lang="en-US" dirty="0" err="1">
+                <a:solidFill>
+                  <a:schemeClr val="bg1"/>
+                </a:solidFill>
+                <a:latin typeface="Calibri" panose="020F0502020204030204" pitchFamily="34" charset="0"/>
+                <a:cs typeface="Calibri" panose="020F0502020204030204" pitchFamily="34" charset="0"/>
+              </a:rPr>
+              <a:t>X_train</a:t>
+            </a:r>
+            <a:r>
+              <a:rPr lang="en-US" dirty="0">
+                <a:solidFill>
+                  <a:schemeClr val="bg1"/>
+                </a:solidFill>
+                <a:latin typeface="Calibri" panose="020F0502020204030204" pitchFamily="34" charset="0"/>
+                <a:cs typeface="Calibri" panose="020F0502020204030204" pitchFamily="34" charset="0"/>
+              </a:rPr>
+              <a:t>, </a:t>
+            </a:r>
+            <a:r>
+              <a:rPr lang="en-US" dirty="0" err="1">
+                <a:solidFill>
+                  <a:schemeClr val="bg1"/>
+                </a:solidFill>
+                <a:latin typeface="Calibri" panose="020F0502020204030204" pitchFamily="34" charset="0"/>
+                <a:cs typeface="Calibri" panose="020F0502020204030204" pitchFamily="34" charset="0"/>
+              </a:rPr>
+              <a:t>Y_train</a:t>
+            </a:r>
+            <a:r>
+              <a:rPr lang="en-US" dirty="0">
+                <a:solidFill>
+                  <a:schemeClr val="bg1"/>
+                </a:solidFill>
+                <a:latin typeface="Calibri" panose="020F0502020204030204" pitchFamily="34" charset="0"/>
+                <a:cs typeface="Calibri" panose="020F0502020204030204" pitchFamily="34" charset="0"/>
+              </a:rPr>
+              <a:t>, </a:t>
+            </a:r>
+            <a:r>
+              <a:rPr lang="en-US" dirty="0" err="1">
+                <a:solidFill>
+                  <a:schemeClr val="bg1"/>
+                </a:solidFill>
+                <a:latin typeface="Calibri" panose="020F0502020204030204" pitchFamily="34" charset="0"/>
+                <a:cs typeface="Calibri" panose="020F0502020204030204" pitchFamily="34" charset="0"/>
+              </a:rPr>
+              <a:t>validation_split</a:t>
+            </a:r>
+            <a:r>
+              <a:rPr lang="en-US" dirty="0">
+                <a:solidFill>
+                  <a:schemeClr val="bg1"/>
+                </a:solidFill>
+                <a:latin typeface="Calibri" panose="020F0502020204030204" pitchFamily="34" charset="0"/>
+                <a:cs typeface="Calibri" panose="020F0502020204030204" pitchFamily="34" charset="0"/>
+              </a:rPr>
+              <a:t>=0.2, </a:t>
+            </a:r>
+          </a:p>
+          <a:p>
+            <a:r>
+              <a:rPr lang="en-US" dirty="0">
+                <a:solidFill>
+                  <a:schemeClr val="bg1"/>
+                </a:solidFill>
+                <a:latin typeface="Calibri" panose="020F0502020204030204" pitchFamily="34" charset="0"/>
+                <a:cs typeface="Calibri" panose="020F0502020204030204" pitchFamily="34" charset="0"/>
+              </a:rPr>
+              <a:t>         callbacks = [</a:t>
             </a:r>
             <a:r>
               <a:rPr lang="en-US" dirty="0" err="1">
@@ -5544,7 +6025,7 @@
                 <a:latin typeface="Calibri" panose="020F0502020204030204" pitchFamily="34" charset="0"/>
                 <a:cs typeface="Calibri" panose="020F0502020204030204" pitchFamily="34" charset="0"/>
               </a:rPr>
-              <a:t>(verbose=1, monitor=‘</a:t>
+              <a:t>(patience=3, monitor='</a:t>
             </a:r>
             <a:r>
               <a:rPr lang="en-US" dirty="0" err="1">
@@ -5564,130 +6045,7 @@
                 <a:latin typeface="Calibri" panose="020F0502020204030204" pitchFamily="34" charset="0"/>
                 <a:cs typeface="Calibri" panose="020F0502020204030204" pitchFamily="34" charset="0"/>
               </a:rPr>
-              <a:t>’, patience = 3)</a:t>
-            </a:r>
-          </a:p>
-          <a:p>
-            <a:endParaRPr lang="en-US" dirty="0">
-              <a:solidFill>
-                <a:schemeClr val="bg1"/>
-              </a:solidFill>
-              <a:latin typeface="Calibri" panose="020F0502020204030204" pitchFamily="34" charset="0"/>
-              <a:cs typeface="Calibri" panose="020F0502020204030204" pitchFamily="34" charset="0"/>
-            </a:endParaRPr>
-          </a:p>
-          <a:p>
-            <a:r>
-              <a:rPr lang="en-US" dirty="0" err="1">
-                <a:solidFill>
-                  <a:schemeClr val="bg1"/>
-                </a:solidFill>
-                <a:latin typeface="Calibri" panose="020F0502020204030204" pitchFamily="34" charset="0"/>
-                <a:cs typeface="Calibri" panose="020F0502020204030204" pitchFamily="34" charset="0"/>
-              </a:rPr>
-              <a:t>model.fit</a:t>
-            </a:r>
-            <a:r>
-              <a:rPr lang="en-US" dirty="0">
-                <a:solidFill>
-                  <a:schemeClr val="bg1"/>
-                </a:solidFill>
-                <a:latin typeface="Calibri" panose="020F0502020204030204" pitchFamily="34" charset="0"/>
-                <a:cs typeface="Calibri" panose="020F0502020204030204" pitchFamily="34" charset="0"/>
-              </a:rPr>
-              <a:t>(</a:t>
-            </a:r>
-            <a:r>
-              <a:rPr lang="en-US" dirty="0" err="1">
-                <a:solidFill>
-                  <a:schemeClr val="bg1"/>
-                </a:solidFill>
-                <a:latin typeface="Calibri" panose="020F0502020204030204" pitchFamily="34" charset="0"/>
-                <a:cs typeface="Calibri" panose="020F0502020204030204" pitchFamily="34" charset="0"/>
-              </a:rPr>
-              <a:t>X_train</a:t>
-            </a:r>
-            <a:r>
-              <a:rPr lang="en-US" dirty="0">
-                <a:solidFill>
-                  <a:schemeClr val="bg1"/>
-                </a:solidFill>
-                <a:latin typeface="Calibri" panose="020F0502020204030204" pitchFamily="34" charset="0"/>
-                <a:cs typeface="Calibri" panose="020F0502020204030204" pitchFamily="34" charset="0"/>
-              </a:rPr>
-              <a:t>, </a:t>
-            </a:r>
-            <a:r>
-              <a:rPr lang="en-US" dirty="0" err="1">
-                <a:solidFill>
-                  <a:schemeClr val="bg1"/>
-                </a:solidFill>
-                <a:latin typeface="Calibri" panose="020F0502020204030204" pitchFamily="34" charset="0"/>
-                <a:cs typeface="Calibri" panose="020F0502020204030204" pitchFamily="34" charset="0"/>
-              </a:rPr>
-              <a:t>Y_train</a:t>
-            </a:r>
-            <a:r>
-              <a:rPr lang="en-US" dirty="0">
-                <a:solidFill>
-                  <a:schemeClr val="bg1"/>
-                </a:solidFill>
-                <a:latin typeface="Calibri" panose="020F0502020204030204" pitchFamily="34" charset="0"/>
-                <a:cs typeface="Calibri" panose="020F0502020204030204" pitchFamily="34" charset="0"/>
-              </a:rPr>
-              <a:t>, </a:t>
-            </a:r>
-            <a:r>
-              <a:rPr lang="en-US" dirty="0" err="1">
-                <a:solidFill>
-                  <a:schemeClr val="bg1"/>
-                </a:solidFill>
-                <a:latin typeface="Calibri" panose="020F0502020204030204" pitchFamily="34" charset="0"/>
-                <a:cs typeface="Calibri" panose="020F0502020204030204" pitchFamily="34" charset="0"/>
-              </a:rPr>
-              <a:t>validation_split</a:t>
-            </a:r>
-            <a:r>
-              <a:rPr lang="en-US" dirty="0">
-                <a:solidFill>
-                  <a:schemeClr val="bg1"/>
-                </a:solidFill>
-                <a:latin typeface="Calibri" panose="020F0502020204030204" pitchFamily="34" charset="0"/>
-                <a:cs typeface="Calibri" panose="020F0502020204030204" pitchFamily="34" charset="0"/>
-              </a:rPr>
-              <a:t>=0.2, </a:t>
-            </a:r>
-          </a:p>
-          <a:p>
-            <a:r>
-              <a:rPr lang="en-US" dirty="0">
-                <a:solidFill>
-                  <a:schemeClr val="bg1"/>
-                </a:solidFill>
-                <a:latin typeface="Calibri" panose="020F0502020204030204" pitchFamily="34" charset="0"/>
-                <a:cs typeface="Calibri" panose="020F0502020204030204" pitchFamily="34" charset="0"/>
-              </a:rPr>
-              <a:t>         callbacks = [</a:t>
-            </a:r>
-            <a:r>
-              <a:rPr lang="en-US" dirty="0" err="1">
-                <a:solidFill>
-                  <a:schemeClr val="bg1"/>
-                </a:solidFill>
-                <a:latin typeface="Calibri" panose="020F0502020204030204" pitchFamily="34" charset="0"/>
-                <a:cs typeface="Calibri" panose="020F0502020204030204" pitchFamily="34" charset="0"/>
-              </a:rPr>
-              <a:t>early_stopping</a:t>
-            </a:r>
-            <a:r>
-              <a:rPr lang="en-US" dirty="0">
-                <a:solidFill>
-                  <a:schemeClr val="bg1"/>
-                </a:solidFill>
-                <a:latin typeface="Calibri" panose="020F0502020204030204" pitchFamily="34" charset="0"/>
-                <a:cs typeface="Calibri" panose="020F0502020204030204" pitchFamily="34" charset="0"/>
-              </a:rPr>
-              <a:t>])</a:t>
+              <a:t>’)])</a:t>
             </a:r>
           </a:p>
         </p:txBody>
@@ -5696,328 +6054,6 @@
     <p:extLst>
       <p:ext uri="{BB962C8B-B14F-4D97-AF65-F5344CB8AC3E}">
         <p14:creationId xmlns:p14="http://schemas.microsoft.com/office/powerpoint/2010/main" val="3561229427"/>
-      </p:ext>
-    </p:extLst>
-  </p:cSld>
-  <p:clrMapOvr>
-    <a:masterClrMapping/>
-  </p:clrMapOvr>
-</p:sld>
-</file>
-
-<file path=ppt/slides/slide11.xml><?xml version="1.0" encoding="utf-8"?>
-<p:sld xmlns:a="http://schemas.openxmlformats.org/drawingml/2006/main" xmlns:r="http://schemas.openxmlformats.org/officeDocument/2006/relationships" xmlns:p="http://schemas.openxmlformats.org/presentationml/2006/main">
-  <p:cSld>
-    <p:bg>
-      <p:bgPr>
-        <a:solidFill>
-          <a:schemeClr val="bg1"/>
-        </a:solidFill>
-        <a:effectLst/>
-      </p:bgPr>
-    </p:bg>
-    <p:spTree>
-      <p:nvGrpSpPr>
-        <p:cNvPr id="1" name=""/>
-        <p:cNvGrpSpPr/>
-        <p:nvPr/>
-      </p:nvGrpSpPr>
-      <p:grpSpPr>
-        <a:xfrm>
-          <a:off x="0" y="0"/>
-          <a:ext cx="0" cy="0"/>
-          <a:chOff x="0" y="0"/>
-          <a:chExt cx="0" cy="0"/>
-        </a:xfrm>
-      </p:grpSpPr>
-      <p:pic>
-        <p:nvPicPr>
-          <p:cNvPr id="6" name="Picture 5">
-            <a:extLst>
-              <a:ext uri="{FF2B5EF4-FFF2-40B4-BE49-F238E27FC236}">
-                <a16:creationId xmlns:a16="http://schemas.microsoft.com/office/drawing/2014/main" id="{13577B90-FBB5-4B16-BB46-D3A5C67C0A0D}"/>
-              </a:ext>
-            </a:extLst>
-          </p:cNvPr>
-          <p:cNvPicPr>
-            <a:picLocks noChangeAspect="1"/>
-          </p:cNvPicPr>
-          <p:nvPr/>
-        </p:nvPicPr>
-        <p:blipFill rotWithShape="1">
-          <a:blip r:embed="rId3"/>
-          <a:srcRect b="8315"/>
-          <a:stretch/>
-        </p:blipFill>
-        <p:spPr>
-          <a:xfrm>
-            <a:off x="-1" y="10"/>
-            <a:ext cx="12192001" cy="4666928"/>
-          </a:xfrm>
-          <a:prstGeom prst="rect">
-            <a:avLst/>
-          </a:prstGeom>
-        </p:spPr>
-      </p:pic>
-      <p:pic>
-        <p:nvPicPr>
-          <p:cNvPr id="15" name="Picture 14">
-            <a:extLst>
-              <a:ext uri="{FF2B5EF4-FFF2-40B4-BE49-F238E27FC236}">
-                <a16:creationId xmlns:a16="http://schemas.microsoft.com/office/drawing/2014/main" id="{EE09A529-E47C-4634-BB98-0A9526C372B4}"/>
-              </a:ext>
-              <a:ext uri="{C183D7F6-B498-43B3-948B-1728B52AA6E4}">
-                <adec:decorative xmlns:adec="http://schemas.microsoft.com/office/drawing/2017/decorative" val="1"/>
-              </a:ext>
-            </a:extLst>
-          </p:cNvPr>
-          <p:cNvPicPr>
-            <a:picLocks noGrp="1" noRot="1" noChangeAspect="1" noMove="1" noResize="1" noEditPoints="1" noAdjustHandles="1" noChangeArrowheads="1" noChangeShapeType="1" noCrop="1"/>
-          </p:cNvPicPr>
-          <p:nvPr>
-            <p:extLst>
-              <p:ext uri="{386F3935-93C4-4BCD-93E2-E3B085C9AB24}">
-                <p16:designElem xmlns:p16="http://schemas.microsoft.com/office/powerpoint/2015/main" val="1"/>
-              </p:ext>
-            </p:extLst>
-          </p:nvPr>
-        </p:nvPicPr>
-        <p:blipFill>
-          <a:blip r:embed="rId4">
-            <a:extLst>
-              <a:ext uri="{28A0092B-C50C-407E-A947-70E740481C1C}">
-                <a14:useLocalDpi xmlns:a14="http://schemas.microsoft.com/office/drawing/2010/main" val="0"/>
-              </a:ext>
-            </a:extLst>
-          </a:blip>
-          <a:stretch>
-            <a:fillRect/>
-          </a:stretch>
-        </p:blipFill>
-        <p:spPr>
-          <a:xfrm>
-            <a:off x="0" y="0"/>
-            <a:ext cx="12192000" cy="6858000"/>
-          </a:xfrm>
-          <a:prstGeom prst="rect">
-            <a:avLst/>
-          </a:prstGeom>
-        </p:spPr>
-      </p:pic>
-      <p:sp>
-        <p:nvSpPr>
-          <p:cNvPr id="17" name="Oval 16">
-            <a:extLst>
-              <a:ext uri="{FF2B5EF4-FFF2-40B4-BE49-F238E27FC236}">
-                <a16:creationId xmlns:a16="http://schemas.microsoft.com/office/drawing/2014/main" id="{569C1A01-6FB5-43CE-ADCC-936728ACAC0D}"/>
-              </a:ext>
-              <a:ext uri="{C183D7F6-B498-43B3-948B-1728B52AA6E4}">
-                <adec:decorative xmlns:adec="http://schemas.microsoft.com/office/drawing/2017/decorative" val="1"/>
-              </a:ext>
-            </a:extLst>
-          </p:cNvPr>
-          <p:cNvSpPr>
-            <a:spLocks noGrp="1" noRot="1" noChangeAspect="1" noMove="1" noResize="1" noEditPoints="1" noAdjustHandles="1" noChangeArrowheads="1" noChangeShapeType="1" noTextEdit="1"/>
-          </p:cNvSpPr>
-          <p:nvPr>
-            <p:extLst>
-              <p:ext uri="{386F3935-93C4-4BCD-93E2-E3B085C9AB24}">
-                <p16:designElem xmlns:p16="http://schemas.microsoft.com/office/powerpoint/2015/main" val="1"/>
-              </p:ext>
-            </p:extLst>
-          </p:nvPr>
-        </p:nvSpPr>
-        <p:spPr>
-          <a:xfrm>
-            <a:off x="1456267" y="4388303"/>
-            <a:ext cx="824089" cy="702986"/>
-          </a:xfrm>
-          <a:prstGeom prst="ellipse">
-            <a:avLst/>
-          </a:prstGeom>
-          <a:solidFill>
-            <a:srgbClr val="FFFFFF"/>
-          </a:solidFill>
-          <a:ln>
-            <a:noFill/>
-          </a:ln>
-        </p:spPr>
-        <p:style>
-          <a:lnRef idx="2">
-            <a:schemeClr val="accent1">
-              <a:shade val="50000"/>
-            </a:schemeClr>
-          </a:lnRef>
-          <a:fillRef idx="1">
-            <a:schemeClr val="accent1"/>
-          </a:fillRef>
-          <a:effectRef idx="0">
-            <a:schemeClr val="accent1"/>
-          </a:effectRef>
-          <a:fontRef idx="minor">
-            <a:schemeClr val="lt1"/>
-          </a:fontRef>
-        </p:style>
-        <p:txBody>
-          <a:bodyPr rtlCol="0" anchor="ctr"/>
-          <a:lstStyle/>
-          <a:p>
-            <a:pPr algn="ctr"/>
-            <a:endParaRPr lang="en-US"/>
-          </a:p>
-        </p:txBody>
-      </p:sp>
-      <p:sp>
-        <p:nvSpPr>
-          <p:cNvPr id="2" name="Title 1">
-            <a:extLst>
-              <a:ext uri="{FF2B5EF4-FFF2-40B4-BE49-F238E27FC236}">
-                <a16:creationId xmlns:a16="http://schemas.microsoft.com/office/drawing/2014/main" id="{9523C2FF-6973-401D-AB3E-DA8C27FCDAE3}"/>
-              </a:ext>
-            </a:extLst>
-          </p:cNvPr>
-          <p:cNvSpPr>
-            <a:spLocks noGrp="1"/>
-          </p:cNvSpPr>
-          <p:nvPr>
-            <p:ph type="title"/>
-          </p:nvPr>
-        </p:nvSpPr>
-        <p:spPr>
-          <a:xfrm>
-            <a:off x="804998" y="4551037"/>
-            <a:ext cx="5021782" cy="1509931"/>
-          </a:xfrm>
-        </p:spPr>
-        <p:txBody>
-          <a:bodyPr>
-            <a:normAutofit/>
-          </a:bodyPr>
-          <a:lstStyle/>
-          <a:p>
-            <a:r>
-              <a:rPr lang="en-US" sz="4000">
-                <a:solidFill>
-                  <a:srgbClr val="000000"/>
-                </a:solidFill>
-              </a:rPr>
-              <a:t>Labs</a:t>
-            </a:r>
-          </a:p>
-        </p:txBody>
-      </p:sp>
-      <p:sp>
-        <p:nvSpPr>
-          <p:cNvPr id="3" name="Content Placeholder 2">
-            <a:extLst>
-              <a:ext uri="{FF2B5EF4-FFF2-40B4-BE49-F238E27FC236}">
-                <a16:creationId xmlns:a16="http://schemas.microsoft.com/office/drawing/2014/main" id="{D5E9B993-44AB-4870-BBA8-A1A97A055BF8}"/>
-              </a:ext>
-            </a:extLst>
-          </p:cNvPr>
-          <p:cNvSpPr>
-            <a:spLocks noGrp="1"/>
-          </p:cNvSpPr>
-          <p:nvPr>
-            <p:ph idx="1"/>
-          </p:nvPr>
-        </p:nvSpPr>
-        <p:spPr>
-          <a:xfrm>
-            <a:off x="6470247" y="4551037"/>
-            <a:ext cx="4926411" cy="1509935"/>
-          </a:xfrm>
-        </p:spPr>
-        <p:txBody>
-          <a:bodyPr anchor="ctr">
-            <a:normAutofit/>
-          </a:bodyPr>
-          <a:lstStyle/>
-          <a:p>
-            <a:r>
-              <a:rPr lang="en-US" sz="1500" dirty="0">
-                <a:solidFill>
-                  <a:srgbClr val="000000"/>
-                </a:solidFill>
-              </a:rPr>
-              <a:t>1</a:t>
-            </a:r>
-            <a:r>
-              <a:rPr lang="en-US" sz="1500" baseline="30000" dirty="0">
-                <a:solidFill>
-                  <a:srgbClr val="000000"/>
-                </a:solidFill>
-              </a:rPr>
-              <a:t>st</a:t>
-            </a:r>
-            <a:r>
-              <a:rPr lang="en-US" sz="1500" dirty="0">
-                <a:solidFill>
-                  <a:srgbClr val="000000"/>
-                </a:solidFill>
-              </a:rPr>
-              <a:t> lab: Simple </a:t>
-            </a:r>
-            <a:r>
-              <a:rPr lang="en-US" sz="1500" dirty="0" err="1">
-                <a:solidFill>
-                  <a:srgbClr val="000000"/>
-                </a:solidFill>
-              </a:rPr>
-              <a:t>keras</a:t>
-            </a:r>
-            <a:r>
-              <a:rPr lang="en-US" sz="1500" dirty="0">
-                <a:solidFill>
-                  <a:srgbClr val="000000"/>
-                </a:solidFill>
-              </a:rPr>
-              <a:t> model (optional)</a:t>
-            </a:r>
-          </a:p>
-          <a:p>
-            <a:r>
-              <a:rPr lang="en-US" sz="1500" dirty="0">
-                <a:solidFill>
-                  <a:srgbClr val="000000"/>
-                </a:solidFill>
-              </a:rPr>
-              <a:t>2</a:t>
-            </a:r>
-            <a:r>
-              <a:rPr lang="en-US" sz="1500" baseline="30000" dirty="0">
-                <a:solidFill>
-                  <a:srgbClr val="000000"/>
-                </a:solidFill>
-              </a:rPr>
-              <a:t>nd</a:t>
-            </a:r>
-            <a:r>
-              <a:rPr lang="en-US" sz="1500" dirty="0">
-                <a:solidFill>
-                  <a:srgbClr val="000000"/>
-                </a:solidFill>
-              </a:rPr>
-              <a:t> Lab: Classification with Fashion MNIST data set</a:t>
-            </a:r>
-          </a:p>
-          <a:p>
-            <a:pPr lvl="1"/>
-            <a:r>
-              <a:rPr lang="en-US" sz="1500" dirty="0">
-                <a:solidFill>
-                  <a:srgbClr val="000000"/>
-                </a:solidFill>
-              </a:rPr>
-              <a:t>Build a model to recognize which fashion category an image belongs</a:t>
-            </a:r>
-          </a:p>
-        </p:txBody>
-      </p:sp>
-    </p:spTree>
-    <p:extLst>
-      <p:ext uri="{BB962C8B-B14F-4D97-AF65-F5344CB8AC3E}">
-        <p14:creationId xmlns:p14="http://schemas.microsoft.com/office/powerpoint/2010/main" val="2681373539"/>
       </p:ext>
     </p:extLst>
   </p:cSld>
@@ -6052,6 +6088,328 @@
           <a:chExt cx="0" cy="0"/>
         </a:xfrm>
       </p:grpSpPr>
+      <p:pic>
+        <p:nvPicPr>
+          <p:cNvPr id="6" name="Picture 5">
+            <a:extLst>
+              <a:ext uri="{FF2B5EF4-FFF2-40B4-BE49-F238E27FC236}">
+                <a16:creationId xmlns:a16="http://schemas.microsoft.com/office/drawing/2014/main" id="{13577B90-FBB5-4B16-BB46-D3A5C67C0A0D}"/>
+              </a:ext>
+            </a:extLst>
+          </p:cNvPr>
+          <p:cNvPicPr>
+            <a:picLocks noChangeAspect="1"/>
+          </p:cNvPicPr>
+          <p:nvPr/>
+        </p:nvPicPr>
+        <p:blipFill rotWithShape="1">
+          <a:blip r:embed="rId3"/>
+          <a:srcRect b="8315"/>
+          <a:stretch/>
+        </p:blipFill>
+        <p:spPr>
+          <a:xfrm>
+            <a:off x="-1" y="10"/>
+            <a:ext cx="12192001" cy="4666928"/>
+          </a:xfrm>
+          <a:prstGeom prst="rect">
+            <a:avLst/>
+          </a:prstGeom>
+        </p:spPr>
+      </p:pic>
+      <p:pic>
+        <p:nvPicPr>
+          <p:cNvPr id="15" name="Picture 14">
+            <a:extLst>
+              <a:ext uri="{FF2B5EF4-FFF2-40B4-BE49-F238E27FC236}">
+                <a16:creationId xmlns:a16="http://schemas.microsoft.com/office/drawing/2014/main" id="{EE09A529-E47C-4634-BB98-0A9526C372B4}"/>
+              </a:ext>
+              <a:ext uri="{C183D7F6-B498-43B3-948B-1728B52AA6E4}">
+                <adec:decorative xmlns:adec="http://schemas.microsoft.com/office/drawing/2017/decorative" val="1"/>
+              </a:ext>
+            </a:extLst>
+          </p:cNvPr>
+          <p:cNvPicPr>
+            <a:picLocks noGrp="1" noRot="1" noChangeAspect="1" noMove="1" noResize="1" noEditPoints="1" noAdjustHandles="1" noChangeArrowheads="1" noChangeShapeType="1" noCrop="1"/>
+          </p:cNvPicPr>
+          <p:nvPr>
+            <p:extLst>
+              <p:ext uri="{386F3935-93C4-4BCD-93E2-E3B085C9AB24}">
+                <p16:designElem xmlns:p16="http://schemas.microsoft.com/office/powerpoint/2015/main" val="1"/>
+              </p:ext>
+            </p:extLst>
+          </p:nvPr>
+        </p:nvPicPr>
+        <p:blipFill>
+          <a:blip r:embed="rId4">
+            <a:extLst>
+              <a:ext uri="{28A0092B-C50C-407E-A947-70E740481C1C}">
+                <a14:useLocalDpi xmlns:a14="http://schemas.microsoft.com/office/drawing/2010/main" val="0"/>
+              </a:ext>
+            </a:extLst>
+          </a:blip>
+          <a:stretch>
+            <a:fillRect/>
+          </a:stretch>
+        </p:blipFill>
+        <p:spPr>
+          <a:xfrm>
+            <a:off x="0" y="0"/>
+            <a:ext cx="12192000" cy="6858000"/>
+          </a:xfrm>
+          <a:prstGeom prst="rect">
+            <a:avLst/>
+          </a:prstGeom>
+        </p:spPr>
+      </p:pic>
+      <p:sp>
+        <p:nvSpPr>
+          <p:cNvPr id="17" name="Oval 16">
+            <a:extLst>
+              <a:ext uri="{FF2B5EF4-FFF2-40B4-BE49-F238E27FC236}">
+                <a16:creationId xmlns:a16="http://schemas.microsoft.com/office/drawing/2014/main" id="{569C1A01-6FB5-43CE-ADCC-936728ACAC0D}"/>
+              </a:ext>
+              <a:ext uri="{C183D7F6-B498-43B3-948B-1728B52AA6E4}">
+                <adec:decorative xmlns:adec="http://schemas.microsoft.com/office/drawing/2017/decorative" val="1"/>
+              </a:ext>
+            </a:extLst>
+          </p:cNvPr>
+          <p:cNvSpPr>
+            <a:spLocks noGrp="1" noRot="1" noChangeAspect="1" noMove="1" noResize="1" noEditPoints="1" noAdjustHandles="1" noChangeArrowheads="1" noChangeShapeType="1" noTextEdit="1"/>
+          </p:cNvSpPr>
+          <p:nvPr>
+            <p:extLst>
+              <p:ext uri="{386F3935-93C4-4BCD-93E2-E3B085C9AB24}">
+                <p16:designElem xmlns:p16="http://schemas.microsoft.com/office/powerpoint/2015/main" val="1"/>
+              </p:ext>
+            </p:extLst>
+          </p:nvPr>
+        </p:nvSpPr>
+        <p:spPr>
+          <a:xfrm>
+            <a:off x="1456267" y="4388303"/>
+            <a:ext cx="824089" cy="702986"/>
+          </a:xfrm>
+          <a:prstGeom prst="ellipse">
+            <a:avLst/>
+          </a:prstGeom>
+          <a:solidFill>
+            <a:srgbClr val="FFFFFF"/>
+          </a:solidFill>
+          <a:ln>
+            <a:noFill/>
+          </a:ln>
+        </p:spPr>
+        <p:style>
+          <a:lnRef idx="2">
+            <a:schemeClr val="accent1">
+              <a:shade val="50000"/>
+            </a:schemeClr>
+          </a:lnRef>
+          <a:fillRef idx="1">
+            <a:schemeClr val="accent1"/>
+          </a:fillRef>
+          <a:effectRef idx="0">
+            <a:schemeClr val="accent1"/>
+          </a:effectRef>
+          <a:fontRef idx="minor">
+            <a:schemeClr val="lt1"/>
+          </a:fontRef>
+        </p:style>
+        <p:txBody>
+          <a:bodyPr rtlCol="0" anchor="ctr"/>
+          <a:lstStyle/>
+          <a:p>
+            <a:pPr algn="ctr"/>
+            <a:endParaRPr lang="en-US"/>
+          </a:p>
+        </p:txBody>
+      </p:sp>
+      <p:sp>
+        <p:nvSpPr>
+          <p:cNvPr id="2" name="Title 1">
+            <a:extLst>
+              <a:ext uri="{FF2B5EF4-FFF2-40B4-BE49-F238E27FC236}">
+                <a16:creationId xmlns:a16="http://schemas.microsoft.com/office/drawing/2014/main" id="{9523C2FF-6973-401D-AB3E-DA8C27FCDAE3}"/>
+              </a:ext>
+            </a:extLst>
+          </p:cNvPr>
+          <p:cNvSpPr>
+            <a:spLocks noGrp="1"/>
+          </p:cNvSpPr>
+          <p:nvPr>
+            <p:ph type="title"/>
+          </p:nvPr>
+        </p:nvSpPr>
+        <p:spPr>
+          <a:xfrm>
+            <a:off x="804998" y="4551037"/>
+            <a:ext cx="5021782" cy="1509931"/>
+          </a:xfrm>
+        </p:spPr>
+        <p:txBody>
+          <a:bodyPr>
+            <a:normAutofit/>
+          </a:bodyPr>
+          <a:lstStyle/>
+          <a:p>
+            <a:r>
+              <a:rPr lang="en-US" sz="4000">
+                <a:solidFill>
+                  <a:srgbClr val="000000"/>
+                </a:solidFill>
+              </a:rPr>
+              <a:t>Labs</a:t>
+            </a:r>
+          </a:p>
+        </p:txBody>
+      </p:sp>
+      <p:sp>
+        <p:nvSpPr>
+          <p:cNvPr id="3" name="Content Placeholder 2">
+            <a:extLst>
+              <a:ext uri="{FF2B5EF4-FFF2-40B4-BE49-F238E27FC236}">
+                <a16:creationId xmlns:a16="http://schemas.microsoft.com/office/drawing/2014/main" id="{D5E9B993-44AB-4870-BBA8-A1A97A055BF8}"/>
+              </a:ext>
+            </a:extLst>
+          </p:cNvPr>
+          <p:cNvSpPr>
+            <a:spLocks noGrp="1"/>
+          </p:cNvSpPr>
+          <p:nvPr>
+            <p:ph idx="1"/>
+          </p:nvPr>
+        </p:nvSpPr>
+        <p:spPr>
+          <a:xfrm>
+            <a:off x="6470247" y="4551037"/>
+            <a:ext cx="4926411" cy="1509935"/>
+          </a:xfrm>
+        </p:spPr>
+        <p:txBody>
+          <a:bodyPr anchor="ctr">
+            <a:normAutofit/>
+          </a:bodyPr>
+          <a:lstStyle/>
+          <a:p>
+            <a:r>
+              <a:rPr lang="en-US" sz="1500" dirty="0">
+                <a:solidFill>
+                  <a:srgbClr val="000000"/>
+                </a:solidFill>
+              </a:rPr>
+              <a:t>1</a:t>
+            </a:r>
+            <a:r>
+              <a:rPr lang="en-US" sz="1500" baseline="30000" dirty="0">
+                <a:solidFill>
+                  <a:srgbClr val="000000"/>
+                </a:solidFill>
+              </a:rPr>
+              <a:t>st</a:t>
+            </a:r>
+            <a:r>
+              <a:rPr lang="en-US" sz="1500" dirty="0">
+                <a:solidFill>
+                  <a:srgbClr val="000000"/>
+                </a:solidFill>
+              </a:rPr>
+              <a:t> lab: Simple </a:t>
+            </a:r>
+            <a:r>
+              <a:rPr lang="en-US" sz="1500" dirty="0" err="1">
+                <a:solidFill>
+                  <a:srgbClr val="000000"/>
+                </a:solidFill>
+              </a:rPr>
+              <a:t>keras</a:t>
+            </a:r>
+            <a:r>
+              <a:rPr lang="en-US" sz="1500" dirty="0">
+                <a:solidFill>
+                  <a:srgbClr val="000000"/>
+                </a:solidFill>
+              </a:rPr>
+              <a:t> model (optional)</a:t>
+            </a:r>
+          </a:p>
+          <a:p>
+            <a:r>
+              <a:rPr lang="en-US" sz="1500" dirty="0">
+                <a:solidFill>
+                  <a:srgbClr val="000000"/>
+                </a:solidFill>
+              </a:rPr>
+              <a:t>2</a:t>
+            </a:r>
+            <a:r>
+              <a:rPr lang="en-US" sz="1500" baseline="30000" dirty="0">
+                <a:solidFill>
+                  <a:srgbClr val="000000"/>
+                </a:solidFill>
+              </a:rPr>
+              <a:t>nd</a:t>
+            </a:r>
+            <a:r>
+              <a:rPr lang="en-US" sz="1500" dirty="0">
+                <a:solidFill>
+                  <a:srgbClr val="000000"/>
+                </a:solidFill>
+              </a:rPr>
+              <a:t> Lab: Classification with Fashion MNIST data set</a:t>
+            </a:r>
+          </a:p>
+          <a:p>
+            <a:pPr lvl="1"/>
+            <a:r>
+              <a:rPr lang="en-US" sz="1500" dirty="0">
+                <a:solidFill>
+                  <a:srgbClr val="000000"/>
+                </a:solidFill>
+              </a:rPr>
+              <a:t>Build a model to recognize which fashion category an image belongs</a:t>
+            </a:r>
+          </a:p>
+        </p:txBody>
+      </p:sp>
+    </p:spTree>
+    <p:extLst>
+      <p:ext uri="{BB962C8B-B14F-4D97-AF65-F5344CB8AC3E}">
+        <p14:creationId xmlns:p14="http://schemas.microsoft.com/office/powerpoint/2010/main" val="2681373539"/>
+      </p:ext>
+    </p:extLst>
+  </p:cSld>
+  <p:clrMapOvr>
+    <a:masterClrMapping/>
+  </p:clrMapOvr>
+</p:sld>
+</file>
+
+<file path=ppt/slides/slide13.xml><?xml version="1.0" encoding="utf-8"?>
+<p:sld xmlns:a="http://schemas.openxmlformats.org/drawingml/2006/main" xmlns:r="http://schemas.openxmlformats.org/officeDocument/2006/relationships" xmlns:p="http://schemas.openxmlformats.org/presentationml/2006/main">
+  <p:cSld>
+    <p:bg>
+      <p:bgPr>
+        <a:solidFill>
+          <a:schemeClr val="bg1"/>
+        </a:solidFill>
+        <a:effectLst/>
+      </p:bgPr>
+    </p:bg>
+    <p:spTree>
+      <p:nvGrpSpPr>
+        <p:cNvPr id="1" name=""/>
+        <p:cNvGrpSpPr/>
+        <p:nvPr/>
+      </p:nvGrpSpPr>
+      <p:grpSpPr>
+        <a:xfrm>
+          <a:off x="0" y="0"/>
+          <a:ext cx="0" cy="0"/>
+          <a:chOff x="0" y="0"/>
+          <a:chExt cx="0" cy="0"/>
+        </a:xfrm>
+      </p:grpSpPr>
       <p:sp>
         <p:nvSpPr>
           <p:cNvPr id="12" name="Rectangle 11">
@@ -6148,13 +6506,18 @@
           <a:p>
             <a:pPr algn="l"/>
             <a:r>
-              <a:rPr lang="en-US" dirty="0">
+              <a:rPr lang="en-US">
                 <a:solidFill>
                   <a:schemeClr val="bg1"/>
                 </a:solidFill>
               </a:rPr>
               <a:t>Questions? </a:t>
             </a:r>
+            <a:endParaRPr lang="en-US" dirty="0">
+              <a:solidFill>
+                <a:schemeClr val="bg1"/>
+              </a:solidFill>
+            </a:endParaRPr>
           </a:p>
         </p:txBody>
       </p:sp>
@@ -6761,7 +7124,7 @@
             </a:r>
             <a:r>
               <a:rPr lang="en-US" sz="2400" dirty="0"/>
-              <a:t>, Theano, CNTK</a:t>
+              <a:t>, Theano, CNTK…</a:t>
             </a:r>
           </a:p>
           <a:p>
@@ -7075,7 +7438,7 @@
             </a:r>
             <a:r>
               <a:rPr lang="en-US" sz="1800" dirty="0" err="1"/>
-              <a:t>mnist</a:t>
+              <a:t>fashion_mnist</a:t>
             </a:r>
             <a:endParaRPr lang="en-US" sz="1800" dirty="0"/>
           </a:p>
@@ -7277,14 +7640,6 @@
 <file path=ppt/slides/slide4.xml><?xml version="1.0" encoding="utf-8"?>
 <p:sld xmlns:a="http://schemas.openxmlformats.org/drawingml/2006/main" xmlns:r="http://schemas.openxmlformats.org/officeDocument/2006/relationships" xmlns:p="http://schemas.openxmlformats.org/presentationml/2006/main">
   <p:cSld>
-    <p:bg>
-      <p:bgPr>
-        <a:solidFill>
-          <a:schemeClr val="bg1"/>
-        </a:solidFill>
-        <a:effectLst/>
-      </p:bgPr>
-    </p:bg>
     <p:spTree>
       <p:nvGrpSpPr>
         <p:cNvPr id="1" name=""/>
@@ -7536,7 +7891,7 @@
     </p:spTree>
     <p:extLst>
       <p:ext uri="{BB962C8B-B14F-4D97-AF65-F5344CB8AC3E}">
-        <p14:creationId xmlns:p14="http://schemas.microsoft.com/office/powerpoint/2010/main" val="4210253479"/>
+        <p14:creationId xmlns:p14="http://schemas.microsoft.com/office/powerpoint/2010/main" val="88201613"/>
       </p:ext>
     </p:extLst>
   </p:cSld>
@@ -7775,15 +8130,7 @@
             <a:pPr lvl="1"/>
             <a:r>
               <a:rPr lang="en-US" sz="2000" dirty="0"/>
-              <a:t>Dense, Convolutional, </a:t>
-            </a:r>
-            <a:r>
-              <a:rPr lang="en-US" sz="2000" dirty="0" err="1"/>
-              <a:t>DropOut</a:t>
-            </a:r>
-            <a:r>
-              <a:rPr lang="en-US" sz="2000" dirty="0"/>
-              <a:t>, Pooling…</a:t>
+              <a:t>Dense, Convolutional, Dropout, Pooling…</a:t>
             </a:r>
           </a:p>
           <a:p>
@@ -7803,7 +8150,7 @@
             <a:pPr lvl="1"/>
             <a:r>
               <a:rPr lang="en-US" sz="2000" dirty="0"/>
-              <a:t>Last layer: specifies the number of predictions t</a:t>
+              <a:t>Last layer: specifies the number of predictions </a:t>
             </a:r>
           </a:p>
           <a:p>
@@ -8046,14 +8393,6 @@
 <file path=ppt/slides/slide6.xml><?xml version="1.0" encoding="utf-8"?>
 <p:sld xmlns:a="http://schemas.openxmlformats.org/drawingml/2006/main" xmlns:r="http://schemas.openxmlformats.org/officeDocument/2006/relationships" xmlns:p="http://schemas.openxmlformats.org/presentationml/2006/main">
   <p:cSld>
-    <p:bg>
-      <p:bgPr>
-        <a:solidFill>
-          <a:schemeClr val="bg1"/>
-        </a:solidFill>
-        <a:effectLst/>
-      </p:bgPr>
-    </p:bg>
     <p:spTree>
       <p:nvGrpSpPr>
         <p:cNvPr id="1" name=""/>
@@ -8068,44 +8407,380 @@
           <a:chExt cx="0" cy="0"/>
         </a:xfrm>
       </p:grpSpPr>
-      <p:sp>
-        <p:nvSpPr>
-          <p:cNvPr id="8" name="Rectangle 7">
-            <a:extLst>
-              <a:ext uri="{FF2B5EF4-FFF2-40B4-BE49-F238E27FC236}">
-                <a16:creationId xmlns:a16="http://schemas.microsoft.com/office/drawing/2014/main" id="{8D70B121-56F4-4848-B38B-182089D909FA}"/>
-              </a:ext>
-              <a:ext uri="{C183D7F6-B498-43B3-948B-1728B52AA6E4}">
-                <adec:decorative xmlns:adec="http://schemas.microsoft.com/office/drawing/2017/decorative" val="1"/>
-              </a:ext>
-            </a:extLst>
-          </p:cNvPr>
-          <p:cNvSpPr>
-            <a:spLocks noGrp="1" noRot="1" noChangeAspect="1" noMove="1" noResize="1" noEditPoints="1" noAdjustHandles="1" noChangeArrowheads="1" noChangeShapeType="1" noTextEdit="1"/>
-          </p:cNvSpPr>
-          <p:nvPr>
-            <p:extLst>
-              <p:ext uri="{386F3935-93C4-4BCD-93E2-E3B085C9AB24}">
-                <p16:designElem xmlns:p16="http://schemas.microsoft.com/office/powerpoint/2015/main" val="1"/>
-              </p:ext>
-            </p:extLst>
-          </p:nvPr>
-        </p:nvSpPr>
-        <p:spPr bwMode="ltGray">
+      <p:pic>
+        <p:nvPicPr>
+          <p:cNvPr id="55299" name="Picture 2"/>
+          <p:cNvPicPr>
+            <a:picLocks noChangeAspect="1" noChangeArrowheads="1"/>
+          </p:cNvPicPr>
+          <p:nvPr/>
+        </p:nvPicPr>
+        <p:blipFill>
+          <a:blip r:embed="rId3">
+            <a:extLst>
+              <a:ext uri="{28A0092B-C50C-407E-A947-70E740481C1C}">
+                <a14:useLocalDpi xmlns:a14="http://schemas.microsoft.com/office/drawing/2010/main" val="0"/>
+              </a:ext>
+            </a:extLst>
+          </a:blip>
+          <a:srcRect/>
+          <a:stretch>
+            <a:fillRect/>
+          </a:stretch>
+        </p:blipFill>
+        <p:spPr bwMode="auto">
           <a:xfrm>
-            <a:off x="321564" y="320040"/>
-            <a:ext cx="11548872" cy="6217920"/>
+            <a:off x="2935739" y="1790933"/>
+            <a:ext cx="6803059" cy="1907905"/>
           </a:xfrm>
           <a:prstGeom prst="rect">
             <a:avLst/>
           </a:prstGeom>
+          <a:noFill/>
+          <a:ln>
+            <a:noFill/>
+          </a:ln>
+          <a:effectLst/>
+          <a:extLst>
+            <a:ext uri="{909E8E84-426E-40DD-AFC4-6F175D3DCCD1}">
+              <a14:hiddenFill xmlns:a14="http://schemas.microsoft.com/office/drawing/2010/main">
+                <a:solidFill>
+                  <a:schemeClr val="accent1"/>
+                </a:solidFill>
+              </a14:hiddenFill>
+            </a:ext>
+            <a:ext uri="{91240B29-F687-4F45-9708-019B960494DF}">
+              <a14:hiddenLine xmlns:a14="http://schemas.microsoft.com/office/drawing/2010/main" w="9525">
+                <a:solidFill>
+                  <a:schemeClr val="tx1"/>
+                </a:solidFill>
+                <a:miter lim="800000"/>
+                <a:headEnd/>
+                <a:tailEnd/>
+              </a14:hiddenLine>
+            </a:ext>
+            <a:ext uri="{AF507438-7753-43E0-B8FC-AC1667EBCBE1}">
+              <a14:hiddenEffects xmlns:a14="http://schemas.microsoft.com/office/drawing/2010/main">
+                <a:effectLst>
+                  <a:outerShdw dist="35921" dir="2700000" algn="ctr" rotWithShape="0">
+                    <a:schemeClr val="bg2"/>
+                  </a:outerShdw>
+                </a:effectLst>
+              </a14:hiddenEffects>
+            </a:ext>
+          </a:extLst>
+        </p:spPr>
+      </p:pic>
+      <p:sp>
+        <p:nvSpPr>
+          <p:cNvPr id="2" name="Arrow: Down 1">
+            <a:extLst>
+              <a:ext uri="{FF2B5EF4-FFF2-40B4-BE49-F238E27FC236}">
+                <a16:creationId xmlns:a16="http://schemas.microsoft.com/office/drawing/2014/main" id="{B321EA18-0A01-47C7-ADF1-2A6D60C6ADC7}"/>
+              </a:ext>
+            </a:extLst>
+          </p:cNvPr>
+          <p:cNvSpPr/>
+          <p:nvPr/>
+        </p:nvSpPr>
+        <p:spPr>
+          <a:xfrm>
+            <a:off x="4440866" y="902727"/>
+            <a:ext cx="97166" cy="696539"/>
+          </a:xfrm>
+          <a:prstGeom prst="downArrow">
+            <a:avLst/>
+          </a:prstGeom>
           <a:solidFill>
-            <a:schemeClr val="tx1">
-              <a:alpha val="8000"/>
+            <a:srgbClr val="FF0000"/>
+          </a:solidFill>
+        </p:spPr>
+        <p:style>
+          <a:lnRef idx="2">
+            <a:schemeClr val="accent1">
+              <a:shade val="50000"/>
             </a:schemeClr>
-          </a:solidFill>
-          <a:ln w="127000" cap="sq" cmpd="thinThick">
-            <a:noFill/>
+          </a:lnRef>
+          <a:fillRef idx="1">
+            <a:schemeClr val="accent1"/>
+          </a:fillRef>
+          <a:effectRef idx="0">
+            <a:schemeClr val="accent1"/>
+          </a:effectRef>
+          <a:fontRef idx="minor">
+            <a:schemeClr val="lt1"/>
+          </a:fontRef>
+        </p:style>
+        <p:txBody>
+          <a:bodyPr rtlCol="0" anchor="ctr"/>
+          <a:lstStyle/>
+          <a:p>
+            <a:pPr algn="ctr"/>
+            <a:endParaRPr lang="en-US">
+              <a:solidFill>
+                <a:srgbClr val="FF0000"/>
+              </a:solidFill>
+            </a:endParaRPr>
+          </a:p>
+        </p:txBody>
+      </p:sp>
+      <p:sp>
+        <p:nvSpPr>
+          <p:cNvPr id="3" name="TextBox 2">
+            <a:extLst>
+              <a:ext uri="{FF2B5EF4-FFF2-40B4-BE49-F238E27FC236}">
+                <a16:creationId xmlns:a16="http://schemas.microsoft.com/office/drawing/2014/main" id="{3639C6EA-81BF-4257-B962-B6690EA108E8}"/>
+              </a:ext>
+            </a:extLst>
+          </p:cNvPr>
+          <p:cNvSpPr txBox="1"/>
+          <p:nvPr/>
+        </p:nvSpPr>
+        <p:spPr>
+          <a:xfrm>
+            <a:off x="4725569" y="5749508"/>
+            <a:ext cx="1095865" cy="369332"/>
+          </a:xfrm>
+          <a:prstGeom prst="rect">
+            <a:avLst/>
+          </a:prstGeom>
+          <a:noFill/>
+        </p:spPr>
+        <p:txBody>
+          <a:bodyPr wrap="square" rtlCol="0">
+            <a:spAutoFit/>
+          </a:bodyPr>
+          <a:lstStyle/>
+          <a:p>
+            <a:r>
+              <a:rPr lang="en-US" dirty="0"/>
+              <a:t>Filters</a:t>
+            </a:r>
+          </a:p>
+        </p:txBody>
+      </p:sp>
+      <p:graphicFrame>
+        <p:nvGraphicFramePr>
+          <p:cNvPr id="4" name="Table 3">
+            <a:extLst>
+              <a:ext uri="{FF2B5EF4-FFF2-40B4-BE49-F238E27FC236}">
+                <a16:creationId xmlns:a16="http://schemas.microsoft.com/office/drawing/2014/main" id="{BE3E643C-4144-4F65-86C6-3B847DE47510}"/>
+              </a:ext>
+            </a:extLst>
+          </p:cNvPr>
+          <p:cNvGraphicFramePr>
+            <a:graphicFrameLocks noGrp="1"/>
+          </p:cNvGraphicFramePr>
+          <p:nvPr>
+            <p:extLst>
+              <p:ext uri="{D42A27DB-BD31-4B8C-83A1-F6EECF244321}">
+                <p14:modId xmlns:p14="http://schemas.microsoft.com/office/powerpoint/2010/main" val="520919538"/>
+              </p:ext>
+            </p:extLst>
+          </p:nvPr>
+        </p:nvGraphicFramePr>
+        <p:xfrm>
+          <a:off x="3596125" y="4016646"/>
+          <a:ext cx="1406181" cy="1005840"/>
+        </p:xfrm>
+        <a:graphic>
+          <a:graphicData uri="http://schemas.openxmlformats.org/drawingml/2006/table">
+            <a:tbl>
+              <a:tblPr firstRow="1" bandRow="1">
+                <a:tableStyleId>{5940675A-B579-460E-94D1-54222C63F5DA}</a:tableStyleId>
+              </a:tblPr>
+              <a:tblGrid>
+                <a:gridCol w="468727">
+                  <a:extLst>
+                    <a:ext uri="{9D8B030D-6E8A-4147-A177-3AD203B41FA5}">
+                      <a16:colId xmlns:a16="http://schemas.microsoft.com/office/drawing/2014/main" val="1374563317"/>
+                    </a:ext>
+                  </a:extLst>
+                </a:gridCol>
+                <a:gridCol w="468727">
+                  <a:extLst>
+                    <a:ext uri="{9D8B030D-6E8A-4147-A177-3AD203B41FA5}">
+                      <a16:colId xmlns:a16="http://schemas.microsoft.com/office/drawing/2014/main" val="2658373344"/>
+                    </a:ext>
+                  </a:extLst>
+                </a:gridCol>
+                <a:gridCol w="468727">
+                  <a:extLst>
+                    <a:ext uri="{9D8B030D-6E8A-4147-A177-3AD203B41FA5}">
+                      <a16:colId xmlns:a16="http://schemas.microsoft.com/office/drawing/2014/main" val="3482081936"/>
+                    </a:ext>
+                  </a:extLst>
+                </a:gridCol>
+              </a:tblGrid>
+              <a:tr h="295189">
+                <a:tc>
+                  <a:txBody>
+                    <a:bodyPr/>
+                    <a:lstStyle/>
+                    <a:p>
+                      <a:r>
+                        <a:rPr lang="en-US" sz="1600" dirty="0"/>
+                        <a:t>.16</a:t>
+                      </a:r>
+                    </a:p>
+                  </a:txBody>
+                  <a:tcPr/>
+                </a:tc>
+                <a:tc>
+                  <a:txBody>
+                    <a:bodyPr/>
+                    <a:lstStyle/>
+                    <a:p>
+                      <a:r>
+                        <a:rPr lang="en-US" sz="1600" dirty="0"/>
+                        <a:t>.90</a:t>
+                      </a:r>
+                    </a:p>
+                  </a:txBody>
+                  <a:tcPr/>
+                </a:tc>
+                <a:tc>
+                  <a:txBody>
+                    <a:bodyPr/>
+                    <a:lstStyle/>
+                    <a:p>
+                      <a:r>
+                        <a:rPr lang="en-US" sz="1600" dirty="0"/>
+                        <a:t>.36</a:t>
+                      </a:r>
+                    </a:p>
+                  </a:txBody>
+                  <a:tcPr/>
+                </a:tc>
+                <a:extLst>
+                  <a:ext uri="{0D108BD9-81ED-4DB2-BD59-A6C34878D82A}">
+                    <a16:rowId xmlns:a16="http://schemas.microsoft.com/office/drawing/2014/main" val="278059915"/>
+                  </a:ext>
+                </a:extLst>
+              </a:tr>
+              <a:tr h="295189">
+                <a:tc>
+                  <a:txBody>
+                    <a:bodyPr/>
+                    <a:lstStyle/>
+                    <a:p>
+                      <a:r>
+                        <a:rPr lang="en-US" sz="1600" dirty="0"/>
+                        <a:t>.23</a:t>
+                      </a:r>
+                    </a:p>
+                  </a:txBody>
+                  <a:tcPr/>
+                </a:tc>
+                <a:tc>
+                  <a:txBody>
+                    <a:bodyPr/>
+                    <a:lstStyle/>
+                    <a:p>
+                      <a:r>
+                        <a:rPr lang="en-US" sz="1600" dirty="0"/>
+                        <a:t>.62</a:t>
+                      </a:r>
+                    </a:p>
+                  </a:txBody>
+                  <a:tcPr/>
+                </a:tc>
+                <a:tc>
+                  <a:txBody>
+                    <a:bodyPr/>
+                    <a:lstStyle/>
+                    <a:p>
+                      <a:r>
+                        <a:rPr lang="en-US" sz="1600" dirty="0"/>
+                        <a:t>.34</a:t>
+                      </a:r>
+                    </a:p>
+                  </a:txBody>
+                  <a:tcPr/>
+                </a:tc>
+                <a:extLst>
+                  <a:ext uri="{0D108BD9-81ED-4DB2-BD59-A6C34878D82A}">
+                    <a16:rowId xmlns:a16="http://schemas.microsoft.com/office/drawing/2014/main" val="4190903836"/>
+                  </a:ext>
+                </a:extLst>
+              </a:tr>
+              <a:tr h="295189">
+                <a:tc>
+                  <a:txBody>
+                    <a:bodyPr/>
+                    <a:lstStyle/>
+                    <a:p>
+                      <a:r>
+                        <a:rPr lang="en-US" sz="1600" dirty="0"/>
+                        <a:t>.71</a:t>
+                      </a:r>
+                    </a:p>
+                  </a:txBody>
+                  <a:tcPr/>
+                </a:tc>
+                <a:tc>
+                  <a:txBody>
+                    <a:bodyPr/>
+                    <a:lstStyle/>
+                    <a:p>
+                      <a:r>
+                        <a:rPr lang="en-US" sz="1600" dirty="0"/>
+                        <a:t>.83</a:t>
+                      </a:r>
+                    </a:p>
+                  </a:txBody>
+                  <a:tcPr/>
+                </a:tc>
+                <a:tc>
+                  <a:txBody>
+                    <a:bodyPr/>
+                    <a:lstStyle/>
+                    <a:p>
+                      <a:r>
+                        <a:rPr lang="en-US" sz="1600" dirty="0"/>
+                        <a:t>.02</a:t>
+                      </a:r>
+                    </a:p>
+                  </a:txBody>
+                  <a:tcPr/>
+                </a:tc>
+                <a:extLst>
+                  <a:ext uri="{0D108BD9-81ED-4DB2-BD59-A6C34878D82A}">
+                    <a16:rowId xmlns:a16="http://schemas.microsoft.com/office/drawing/2014/main" val="3696965170"/>
+                  </a:ext>
+                </a:extLst>
+              </a:tr>
+            </a:tbl>
+          </a:graphicData>
+        </a:graphic>
+      </p:graphicFrame>
+      <p:sp>
+        <p:nvSpPr>
+          <p:cNvPr id="9" name="Rounded Rectangle 5">
+            <a:extLst>
+              <a:ext uri="{FF2B5EF4-FFF2-40B4-BE49-F238E27FC236}">
+                <a16:creationId xmlns:a16="http://schemas.microsoft.com/office/drawing/2014/main" id="{EB259AFF-E3B9-4230-8A49-1B5F3EB00BA1}"/>
+              </a:ext>
+            </a:extLst>
+          </p:cNvPr>
+          <p:cNvSpPr/>
+          <p:nvPr/>
+        </p:nvSpPr>
+        <p:spPr>
+          <a:xfrm>
+            <a:off x="5206373" y="1761185"/>
+            <a:ext cx="1132956" cy="2099572"/>
+          </a:xfrm>
+          <a:prstGeom prst="roundRect">
+            <a:avLst/>
+          </a:prstGeom>
+          <a:noFill/>
+          <a:ln>
+            <a:solidFill>
+              <a:schemeClr val="accent6">
+                <a:lumMod val="50000"/>
+              </a:schemeClr>
+            </a:solidFill>
           </a:ln>
         </p:spPr>
         <p:style>
@@ -8125,251 +8800,113 @@
           </a:fontRef>
         </p:style>
         <p:txBody>
-          <a:bodyPr rtlCol="0" anchor="ctr"/>
-          <a:lstStyle/>
-          <a:p>
-            <a:pPr algn="ctr"/>
-            <a:endParaRPr lang="en-US"/>
-          </a:p>
-        </p:txBody>
-      </p:sp>
-      <p:sp>
-        <p:nvSpPr>
-          <p:cNvPr id="2" name="Title 1">
-            <a:extLst>
-              <a:ext uri="{FF2B5EF4-FFF2-40B4-BE49-F238E27FC236}">
-                <a16:creationId xmlns:a16="http://schemas.microsoft.com/office/drawing/2014/main" id="{9523C2FF-6973-401D-AB3E-DA8C27FCDAE3}"/>
-              </a:ext>
-            </a:extLst>
-          </p:cNvPr>
-          <p:cNvSpPr>
-            <a:spLocks noGrp="1"/>
-          </p:cNvSpPr>
-          <p:nvPr>
-            <p:ph type="title"/>
-          </p:nvPr>
+          <a:bodyPr anchor="ctr"/>
+          <a:lstStyle/>
+          <a:p>
+            <a:pPr algn="ctr">
+              <a:defRPr/>
+            </a:pPr>
+            <a:endParaRPr lang="en-GB" dirty="0"/>
+          </a:p>
+        </p:txBody>
+      </p:sp>
+      <p:sp>
+        <p:nvSpPr>
+          <p:cNvPr id="10" name="Rounded Rectangle 5">
+            <a:extLst>
+              <a:ext uri="{FF2B5EF4-FFF2-40B4-BE49-F238E27FC236}">
+                <a16:creationId xmlns:a16="http://schemas.microsoft.com/office/drawing/2014/main" id="{B2DBE5FD-7FED-4445-9918-53DE2B51F97A}"/>
+              </a:ext>
+            </a:extLst>
+          </p:cNvPr>
+          <p:cNvSpPr/>
+          <p:nvPr/>
         </p:nvSpPr>
         <p:spPr>
           <a:xfrm>
-            <a:off x="744644" y="601661"/>
-            <a:ext cx="3494362" cy="4930246"/>
+            <a:off x="3767315" y="1761185"/>
+            <a:ext cx="1132956" cy="2099572"/>
           </a:xfrm>
-        </p:spPr>
-        <p:txBody>
-          <a:bodyPr>
-            <a:normAutofit/>
-          </a:bodyPr>
-          <a:lstStyle/>
-          <a:p>
-            <a:pPr algn="r"/>
-            <a:r>
-              <a:rPr lang="en-US" dirty="0">
-                <a:solidFill>
-                  <a:schemeClr val="accent1"/>
-                </a:solidFill>
-              </a:rPr>
-              <a:t>Compile a model</a:t>
-            </a:r>
-          </a:p>
-        </p:txBody>
-      </p:sp>
-      <p:cxnSp>
-        <p:nvCxnSpPr>
-          <p:cNvPr id="10" name="Straight Connector 9">
-            <a:extLst>
-              <a:ext uri="{FF2B5EF4-FFF2-40B4-BE49-F238E27FC236}">
-                <a16:creationId xmlns:a16="http://schemas.microsoft.com/office/drawing/2014/main" id="{2D72A2C9-F3CA-4216-8BAD-FA4C970C3C4E}"/>
-              </a:ext>
-              <a:ext uri="{C183D7F6-B498-43B3-948B-1728B52AA6E4}">
-                <adec:decorative xmlns:adec="http://schemas.microsoft.com/office/drawing/2017/decorative" val="1"/>
-              </a:ext>
-            </a:extLst>
-          </p:cNvPr>
-          <p:cNvCxnSpPr>
-            <a:cxnSpLocks noGrp="1" noRot="1" noChangeAspect="1" noMove="1" noResize="1" noEditPoints="1" noAdjustHandles="1" noChangeArrowheads="1" noChangeShapeType="1"/>
-          </p:cNvCxnSpPr>
-          <p:nvPr>
-            <p:extLst>
-              <p:ext uri="{386F3935-93C4-4BCD-93E2-E3B085C9AB24}">
-                <p16:designElem xmlns:p16="http://schemas.microsoft.com/office/powerpoint/2015/main" val="1"/>
-              </p:ext>
-            </p:extLst>
-          </p:nvPr>
-        </p:nvCxnSpPr>
-        <p:spPr>
-          <a:xfrm>
-            <a:off x="4654296" y="2057400"/>
-            <a:ext cx="0" cy="2743200"/>
-          </a:xfrm>
-          <a:prstGeom prst="line">
+          <a:prstGeom prst="roundRect">
             <a:avLst/>
           </a:prstGeom>
-          <a:ln w="19050">
+          <a:noFill/>
+          <a:ln>
             <a:solidFill>
-              <a:schemeClr val="tx1">
-                <a:lumMod val="85000"/>
-                <a:lumOff val="15000"/>
+              <a:schemeClr val="accent6">
+                <a:lumMod val="50000"/>
               </a:schemeClr>
             </a:solidFill>
           </a:ln>
         </p:spPr>
         <p:style>
-          <a:lnRef idx="1">
-            <a:schemeClr val="accent1"/>
+          <a:lnRef idx="2">
+            <a:schemeClr val="accent1">
+              <a:shade val="50000"/>
+            </a:schemeClr>
           </a:lnRef>
-          <a:fillRef idx="0">
+          <a:fillRef idx="1">
             <a:schemeClr val="accent1"/>
           </a:fillRef>
           <a:effectRef idx="0">
             <a:schemeClr val="accent1"/>
           </a:effectRef>
           <a:fontRef idx="minor">
-            <a:schemeClr val="tx1"/>
+            <a:schemeClr val="lt1"/>
           </a:fontRef>
         </p:style>
-      </p:cxnSp>
-      <p:sp>
-        <p:nvSpPr>
-          <p:cNvPr id="3" name="Content Placeholder 2">
-            <a:extLst>
-              <a:ext uri="{FF2B5EF4-FFF2-40B4-BE49-F238E27FC236}">
-                <a16:creationId xmlns:a16="http://schemas.microsoft.com/office/drawing/2014/main" id="{D5E9B993-44AB-4870-BBA8-A1A97A055BF8}"/>
-              </a:ext>
-            </a:extLst>
-          </p:cNvPr>
-          <p:cNvSpPr>
-            <a:spLocks noGrp="1"/>
-          </p:cNvSpPr>
-          <p:nvPr>
-            <p:ph idx="1"/>
-          </p:nvPr>
+        <p:txBody>
+          <a:bodyPr anchor="ctr"/>
+          <a:lstStyle/>
+          <a:p>
+            <a:pPr algn="ctr">
+              <a:defRPr/>
+            </a:pPr>
+            <a:endParaRPr lang="en-GB" dirty="0"/>
+          </a:p>
+        </p:txBody>
+      </p:sp>
+      <p:sp>
+        <p:nvSpPr>
+          <p:cNvPr id="12" name="TextBox 11">
+            <a:extLst>
+              <a:ext uri="{FF2B5EF4-FFF2-40B4-BE49-F238E27FC236}">
+                <a16:creationId xmlns:a16="http://schemas.microsoft.com/office/drawing/2014/main" id="{48B5BF0E-7D53-434A-AEE1-753FD497F092}"/>
+              </a:ext>
+            </a:extLst>
+          </p:cNvPr>
+          <p:cNvSpPr txBox="1"/>
+          <p:nvPr/>
         </p:nvSpPr>
         <p:spPr>
           <a:xfrm>
-            <a:off x="4849198" y="454079"/>
-            <a:ext cx="7021237" cy="4628569"/>
+            <a:off x="6986650" y="465976"/>
+            <a:ext cx="1395931" cy="369332"/>
           </a:xfrm>
+          <a:prstGeom prst="rect">
+            <a:avLst/>
+          </a:prstGeom>
+          <a:noFill/>
         </p:spPr>
         <p:txBody>
-          <a:bodyPr anchor="ctr">
-            <a:normAutofit/>
+          <a:bodyPr wrap="square" rtlCol="0">
+            <a:spAutoFit/>
           </a:bodyPr>
           <a:lstStyle/>
           <a:p>
             <a:r>
-              <a:rPr lang="en-US" sz="2400" dirty="0"/>
-              <a:t>Optimizers</a:t>
-            </a:r>
-          </a:p>
-          <a:p>
-            <a:pPr lvl="1"/>
-            <a:r>
-              <a:rPr lang="en-US" sz="2000" dirty="0"/>
-              <a:t>Controls the learning rate</a:t>
-            </a:r>
-          </a:p>
-          <a:p>
-            <a:pPr lvl="1"/>
-            <a:r>
-              <a:rPr lang="en-US" sz="2000" dirty="0"/>
-              <a:t>Lots of options  </a:t>
-            </a:r>
-          </a:p>
-          <a:p>
-            <a:pPr lvl="1"/>
-            <a:r>
-              <a:rPr lang="en-US" sz="2000" dirty="0"/>
-              <a:t>Common choices: Adam, Stochastic gradient descent (SGD) </a:t>
-            </a:r>
-          </a:p>
-          <a:p>
-            <a:r>
-              <a:rPr lang="en-US" sz="2400" dirty="0"/>
-              <a:t>Loss functions</a:t>
-            </a:r>
-          </a:p>
-          <a:p>
-            <a:pPr lvl="1"/>
-            <a:r>
-              <a:rPr lang="en-US" sz="2000" dirty="0">
-                <a:latin typeface="Calibri" panose="020F0502020204030204" pitchFamily="34" charset="0"/>
-                <a:cs typeface="Calibri" panose="020F0502020204030204" pitchFamily="34" charset="0"/>
-              </a:rPr>
-              <a:t>Lots of options</a:t>
-            </a:r>
-          </a:p>
-          <a:p>
-            <a:pPr lvl="1"/>
-            <a:r>
-              <a:rPr lang="en-US" sz="2000" dirty="0">
-                <a:latin typeface="Calibri" panose="020F0502020204030204" pitchFamily="34" charset="0"/>
-                <a:cs typeface="Calibri" panose="020F0502020204030204" pitchFamily="34" charset="0"/>
-              </a:rPr>
-              <a:t>Common choices: </a:t>
-            </a:r>
-            <a:r>
-              <a:rPr lang="en-US" sz="2000" i="1" dirty="0" err="1">
-                <a:latin typeface="Calibri" panose="020F0502020204030204" pitchFamily="34" charset="0"/>
-                <a:cs typeface="Calibri" panose="020F0502020204030204" pitchFamily="34" charset="0"/>
-              </a:rPr>
-              <a:t>mean_squared_error</a:t>
-            </a:r>
-            <a:r>
-              <a:rPr lang="en-US" sz="2000" i="1" dirty="0">
-                <a:latin typeface="Calibri" panose="020F0502020204030204" pitchFamily="34" charset="0"/>
-                <a:cs typeface="Calibri" panose="020F0502020204030204" pitchFamily="34" charset="0"/>
-              </a:rPr>
-              <a:t> </a:t>
-            </a:r>
-            <a:r>
-              <a:rPr lang="en-US" sz="2000" dirty="0">
-                <a:latin typeface="Calibri" panose="020F0502020204030204" pitchFamily="34" charset="0"/>
-                <a:cs typeface="Calibri" panose="020F0502020204030204" pitchFamily="34" charset="0"/>
-              </a:rPr>
-              <a:t>for regression and </a:t>
-            </a:r>
-            <a:r>
-              <a:rPr lang="en-US" sz="2000" i="1" dirty="0" err="1">
-                <a:latin typeface="Calibri" panose="020F0502020204030204" pitchFamily="34" charset="0"/>
-                <a:cs typeface="Calibri" panose="020F0502020204030204" pitchFamily="34" charset="0"/>
-              </a:rPr>
-              <a:t>categorical_crossentropy</a:t>
-            </a:r>
-            <a:r>
-              <a:rPr lang="en-US" sz="2000" i="1" dirty="0">
-                <a:latin typeface="Calibri" panose="020F0502020204030204" pitchFamily="34" charset="0"/>
-                <a:cs typeface="Calibri" panose="020F0502020204030204" pitchFamily="34" charset="0"/>
-              </a:rPr>
-              <a:t> </a:t>
-            </a:r>
-            <a:r>
-              <a:rPr lang="en-US" sz="2000" dirty="0">
-                <a:latin typeface="Calibri" panose="020F0502020204030204" pitchFamily="34" charset="0"/>
-                <a:cs typeface="Calibri" panose="020F0502020204030204" pitchFamily="34" charset="0"/>
-              </a:rPr>
-              <a:t>for classification</a:t>
-            </a:r>
-          </a:p>
-          <a:p>
-            <a:r>
-              <a:rPr lang="en-US" sz="2400" dirty="0"/>
-              <a:t>Metrics</a:t>
-            </a:r>
-          </a:p>
-          <a:p>
-            <a:r>
-              <a:rPr lang="en-US" sz="2400" dirty="0"/>
-              <a:t>Review model summary</a:t>
-            </a:r>
-          </a:p>
-        </p:txBody>
-      </p:sp>
-      <p:sp>
-        <p:nvSpPr>
-          <p:cNvPr id="7" name="Rectangle 6">
-            <a:extLst>
-              <a:ext uri="{FF2B5EF4-FFF2-40B4-BE49-F238E27FC236}">
-                <a16:creationId xmlns:a16="http://schemas.microsoft.com/office/drawing/2014/main" id="{50D33E55-670C-4406-96D9-539EE0DF19ED}"/>
+              <a:rPr lang="en-US" dirty="0"/>
+              <a:t>Dense layers</a:t>
+            </a:r>
+          </a:p>
+        </p:txBody>
+      </p:sp>
+      <p:sp>
+        <p:nvSpPr>
+          <p:cNvPr id="13" name="Arrow: Down 12">
+            <a:extLst>
+              <a:ext uri="{FF2B5EF4-FFF2-40B4-BE49-F238E27FC236}">
+                <a16:creationId xmlns:a16="http://schemas.microsoft.com/office/drawing/2014/main" id="{F396C680-29B0-47C7-B21B-E360A03FAEF1}"/>
               </a:ext>
             </a:extLst>
           </p:cNvPr>
@@ -8378,8 +8915,450 @@
         </p:nvSpPr>
         <p:spPr>
           <a:xfrm>
-            <a:off x="1281181" y="4981746"/>
-            <a:ext cx="8655839" cy="1435683"/>
+            <a:off x="5724268" y="923826"/>
+            <a:ext cx="97166" cy="696539"/>
+          </a:xfrm>
+          <a:prstGeom prst="downArrow">
+            <a:avLst/>
+          </a:prstGeom>
+          <a:solidFill>
+            <a:srgbClr val="FF0000"/>
+          </a:solidFill>
+        </p:spPr>
+        <p:style>
+          <a:lnRef idx="2">
+            <a:schemeClr val="accent1">
+              <a:shade val="50000"/>
+            </a:schemeClr>
+          </a:lnRef>
+          <a:fillRef idx="1">
+            <a:schemeClr val="accent1"/>
+          </a:fillRef>
+          <a:effectRef idx="0">
+            <a:schemeClr val="accent1"/>
+          </a:effectRef>
+          <a:fontRef idx="minor">
+            <a:schemeClr val="lt1"/>
+          </a:fontRef>
+        </p:style>
+        <p:txBody>
+          <a:bodyPr rtlCol="0" anchor="ctr"/>
+          <a:lstStyle/>
+          <a:p>
+            <a:pPr algn="ctr"/>
+            <a:endParaRPr lang="en-US">
+              <a:solidFill>
+                <a:srgbClr val="FF0000"/>
+              </a:solidFill>
+            </a:endParaRPr>
+          </a:p>
+        </p:txBody>
+      </p:sp>
+      <p:sp>
+        <p:nvSpPr>
+          <p:cNvPr id="14" name="Arrow: Down 13">
+            <a:extLst>
+              <a:ext uri="{FF2B5EF4-FFF2-40B4-BE49-F238E27FC236}">
+                <a16:creationId xmlns:a16="http://schemas.microsoft.com/office/drawing/2014/main" id="{51F240B7-AE2E-4609-BB1F-F4B05588B47B}"/>
+              </a:ext>
+            </a:extLst>
+          </p:cNvPr>
+          <p:cNvSpPr/>
+          <p:nvPr/>
+        </p:nvSpPr>
+        <p:spPr>
+          <a:xfrm>
+            <a:off x="6986650" y="905126"/>
+            <a:ext cx="97166" cy="696539"/>
+          </a:xfrm>
+          <a:prstGeom prst="downArrow">
+            <a:avLst/>
+          </a:prstGeom>
+          <a:solidFill>
+            <a:srgbClr val="FF0000"/>
+          </a:solidFill>
+        </p:spPr>
+        <p:style>
+          <a:lnRef idx="2">
+            <a:schemeClr val="accent1">
+              <a:shade val="50000"/>
+            </a:schemeClr>
+          </a:lnRef>
+          <a:fillRef idx="1">
+            <a:schemeClr val="accent1"/>
+          </a:fillRef>
+          <a:effectRef idx="0">
+            <a:schemeClr val="accent1"/>
+          </a:effectRef>
+          <a:fontRef idx="minor">
+            <a:schemeClr val="lt1"/>
+          </a:fontRef>
+        </p:style>
+        <p:txBody>
+          <a:bodyPr rtlCol="0" anchor="ctr"/>
+          <a:lstStyle/>
+          <a:p>
+            <a:pPr algn="ctr"/>
+            <a:endParaRPr lang="en-US">
+              <a:solidFill>
+                <a:srgbClr val="FF0000"/>
+              </a:solidFill>
+            </a:endParaRPr>
+          </a:p>
+        </p:txBody>
+      </p:sp>
+      <p:graphicFrame>
+        <p:nvGraphicFramePr>
+          <p:cNvPr id="15" name="Table 14">
+            <a:extLst>
+              <a:ext uri="{FF2B5EF4-FFF2-40B4-BE49-F238E27FC236}">
+                <a16:creationId xmlns:a16="http://schemas.microsoft.com/office/drawing/2014/main" id="{DB008B50-AEB7-45A4-B708-03FBF5F140A2}"/>
+              </a:ext>
+            </a:extLst>
+          </p:cNvPr>
+          <p:cNvGraphicFramePr>
+            <a:graphicFrameLocks noGrp="1"/>
+          </p:cNvGraphicFramePr>
+          <p:nvPr>
+            <p:extLst>
+              <p:ext uri="{D42A27DB-BD31-4B8C-83A1-F6EECF244321}">
+                <p14:modId xmlns:p14="http://schemas.microsoft.com/office/powerpoint/2010/main" val="2605406792"/>
+              </p:ext>
+            </p:extLst>
+          </p:nvPr>
+        </p:nvGraphicFramePr>
+        <p:xfrm>
+          <a:off x="5154706" y="4015097"/>
+          <a:ext cx="1406181" cy="1005840"/>
+        </p:xfrm>
+        <a:graphic>
+          <a:graphicData uri="http://schemas.openxmlformats.org/drawingml/2006/table">
+            <a:tbl>
+              <a:tblPr firstRow="1" bandRow="1">
+                <a:tableStyleId>{5940675A-B579-460E-94D1-54222C63F5DA}</a:tableStyleId>
+              </a:tblPr>
+              <a:tblGrid>
+                <a:gridCol w="468727">
+                  <a:extLst>
+                    <a:ext uri="{9D8B030D-6E8A-4147-A177-3AD203B41FA5}">
+                      <a16:colId xmlns:a16="http://schemas.microsoft.com/office/drawing/2014/main" val="1374563317"/>
+                    </a:ext>
+                  </a:extLst>
+                </a:gridCol>
+                <a:gridCol w="468727">
+                  <a:extLst>
+                    <a:ext uri="{9D8B030D-6E8A-4147-A177-3AD203B41FA5}">
+                      <a16:colId xmlns:a16="http://schemas.microsoft.com/office/drawing/2014/main" val="2658373344"/>
+                    </a:ext>
+                  </a:extLst>
+                </a:gridCol>
+                <a:gridCol w="468727">
+                  <a:extLst>
+                    <a:ext uri="{9D8B030D-6E8A-4147-A177-3AD203B41FA5}">
+                      <a16:colId xmlns:a16="http://schemas.microsoft.com/office/drawing/2014/main" val="3482081936"/>
+                    </a:ext>
+                  </a:extLst>
+                </a:gridCol>
+              </a:tblGrid>
+              <a:tr h="295189">
+                <a:tc>
+                  <a:txBody>
+                    <a:bodyPr/>
+                    <a:lstStyle/>
+                    <a:p>
+                      <a:r>
+                        <a:rPr lang="en-US" sz="1600" dirty="0"/>
+                        <a:t>.22</a:t>
+                      </a:r>
+                    </a:p>
+                  </a:txBody>
+                  <a:tcPr/>
+                </a:tc>
+                <a:tc>
+                  <a:txBody>
+                    <a:bodyPr/>
+                    <a:lstStyle/>
+                    <a:p>
+                      <a:r>
+                        <a:rPr lang="en-US" sz="1600" dirty="0"/>
+                        <a:t>.09</a:t>
+                      </a:r>
+                    </a:p>
+                  </a:txBody>
+                  <a:tcPr/>
+                </a:tc>
+                <a:tc>
+                  <a:txBody>
+                    <a:bodyPr/>
+                    <a:lstStyle/>
+                    <a:p>
+                      <a:r>
+                        <a:rPr lang="en-US" sz="1600" dirty="0"/>
+                        <a:t>.63</a:t>
+                      </a:r>
+                    </a:p>
+                  </a:txBody>
+                  <a:tcPr/>
+                </a:tc>
+                <a:extLst>
+                  <a:ext uri="{0D108BD9-81ED-4DB2-BD59-A6C34878D82A}">
+                    <a16:rowId xmlns:a16="http://schemas.microsoft.com/office/drawing/2014/main" val="278059915"/>
+                  </a:ext>
+                </a:extLst>
+              </a:tr>
+              <a:tr h="295189">
+                <a:tc>
+                  <a:txBody>
+                    <a:bodyPr/>
+                    <a:lstStyle/>
+                    <a:p>
+                      <a:r>
+                        <a:rPr lang="en-US" sz="1600" dirty="0"/>
+                        <a:t>.32</a:t>
+                      </a:r>
+                    </a:p>
+                  </a:txBody>
+                  <a:tcPr/>
+                </a:tc>
+                <a:tc>
+                  <a:txBody>
+                    <a:bodyPr/>
+                    <a:lstStyle/>
+                    <a:p>
+                      <a:r>
+                        <a:rPr lang="en-US" sz="1600" dirty="0"/>
+                        <a:t>.26</a:t>
+                      </a:r>
+                    </a:p>
+                  </a:txBody>
+                  <a:tcPr/>
+                </a:tc>
+                <a:tc>
+                  <a:txBody>
+                    <a:bodyPr/>
+                    <a:lstStyle/>
+                    <a:p>
+                      <a:r>
+                        <a:rPr lang="en-US" sz="1600" dirty="0"/>
+                        <a:t>.43</a:t>
+                      </a:r>
+                    </a:p>
+                  </a:txBody>
+                  <a:tcPr/>
+                </a:tc>
+                <a:extLst>
+                  <a:ext uri="{0D108BD9-81ED-4DB2-BD59-A6C34878D82A}">
+                    <a16:rowId xmlns:a16="http://schemas.microsoft.com/office/drawing/2014/main" val="4190903836"/>
+                  </a:ext>
+                </a:extLst>
+              </a:tr>
+              <a:tr h="295189">
+                <a:tc>
+                  <a:txBody>
+                    <a:bodyPr/>
+                    <a:lstStyle/>
+                    <a:p>
+                      <a:r>
+                        <a:rPr lang="en-US" sz="1600" dirty="0"/>
+                        <a:t>.17</a:t>
+                      </a:r>
+                    </a:p>
+                  </a:txBody>
+                  <a:tcPr/>
+                </a:tc>
+                <a:tc>
+                  <a:txBody>
+                    <a:bodyPr/>
+                    <a:lstStyle/>
+                    <a:p>
+                      <a:r>
+                        <a:rPr lang="en-US" sz="1600" dirty="0"/>
+                        <a:t>.83</a:t>
+                      </a:r>
+                    </a:p>
+                  </a:txBody>
+                  <a:tcPr/>
+                </a:tc>
+                <a:tc>
+                  <a:txBody>
+                    <a:bodyPr/>
+                    <a:lstStyle/>
+                    <a:p>
+                      <a:r>
+                        <a:rPr lang="en-US" sz="1600" dirty="0"/>
+                        <a:t>.19</a:t>
+                      </a:r>
+                    </a:p>
+                  </a:txBody>
+                  <a:tcPr/>
+                </a:tc>
+                <a:extLst>
+                  <a:ext uri="{0D108BD9-81ED-4DB2-BD59-A6C34878D82A}">
+                    <a16:rowId xmlns:a16="http://schemas.microsoft.com/office/drawing/2014/main" val="3696965170"/>
+                  </a:ext>
+                </a:extLst>
+              </a:tr>
+            </a:tbl>
+          </a:graphicData>
+        </a:graphic>
+      </p:graphicFrame>
+      <p:sp>
+        <p:nvSpPr>
+          <p:cNvPr id="16" name="TextBox 15">
+            <a:extLst>
+              <a:ext uri="{FF2B5EF4-FFF2-40B4-BE49-F238E27FC236}">
+                <a16:creationId xmlns:a16="http://schemas.microsoft.com/office/drawing/2014/main" id="{B9E32667-220A-47E5-9468-6282F928E1B3}"/>
+              </a:ext>
+            </a:extLst>
+          </p:cNvPr>
+          <p:cNvSpPr txBox="1"/>
+          <p:nvPr/>
+        </p:nvSpPr>
+        <p:spPr>
+          <a:xfrm>
+            <a:off x="4159838" y="465976"/>
+            <a:ext cx="2093070" cy="369332"/>
+          </a:xfrm>
+          <a:prstGeom prst="rect">
+            <a:avLst/>
+          </a:prstGeom>
+          <a:noFill/>
+        </p:spPr>
+        <p:txBody>
+          <a:bodyPr wrap="square" rtlCol="0">
+            <a:spAutoFit/>
+          </a:bodyPr>
+          <a:lstStyle/>
+          <a:p>
+            <a:r>
+              <a:rPr lang="en-US" dirty="0"/>
+              <a:t>Convolutional layers</a:t>
+            </a:r>
+          </a:p>
+        </p:txBody>
+      </p:sp>
+      <p:sp>
+        <p:nvSpPr>
+          <p:cNvPr id="17" name="Arrow: Down 16">
+            <a:extLst>
+              <a:ext uri="{FF2B5EF4-FFF2-40B4-BE49-F238E27FC236}">
+                <a16:creationId xmlns:a16="http://schemas.microsoft.com/office/drawing/2014/main" id="{23697765-A12D-48C9-A9C5-107F62CFA032}"/>
+              </a:ext>
+            </a:extLst>
+          </p:cNvPr>
+          <p:cNvSpPr/>
+          <p:nvPr/>
+        </p:nvSpPr>
+        <p:spPr>
+          <a:xfrm rot="10800000">
+            <a:off x="5817233" y="5130212"/>
+            <a:ext cx="97166" cy="696539"/>
+          </a:xfrm>
+          <a:prstGeom prst="downArrow">
+            <a:avLst/>
+          </a:prstGeom>
+          <a:solidFill>
+            <a:srgbClr val="FF0000"/>
+          </a:solidFill>
+        </p:spPr>
+        <p:style>
+          <a:lnRef idx="2">
+            <a:schemeClr val="accent1">
+              <a:shade val="50000"/>
+            </a:schemeClr>
+          </a:lnRef>
+          <a:fillRef idx="1">
+            <a:schemeClr val="accent1"/>
+          </a:fillRef>
+          <a:effectRef idx="0">
+            <a:schemeClr val="accent1"/>
+          </a:effectRef>
+          <a:fontRef idx="minor">
+            <a:schemeClr val="lt1"/>
+          </a:fontRef>
+        </p:style>
+        <p:txBody>
+          <a:bodyPr rtlCol="0" anchor="ctr"/>
+          <a:lstStyle/>
+          <a:p>
+            <a:pPr algn="ctr"/>
+            <a:endParaRPr lang="en-US">
+              <a:solidFill>
+                <a:srgbClr val="FF0000"/>
+              </a:solidFill>
+            </a:endParaRPr>
+          </a:p>
+        </p:txBody>
+      </p:sp>
+      <p:sp>
+        <p:nvSpPr>
+          <p:cNvPr id="18" name="Arrow: Down 17">
+            <a:extLst>
+              <a:ext uri="{FF2B5EF4-FFF2-40B4-BE49-F238E27FC236}">
+                <a16:creationId xmlns:a16="http://schemas.microsoft.com/office/drawing/2014/main" id="{DBF4F161-812F-42E8-8AFA-4E83B4D57E9C}"/>
+              </a:ext>
+            </a:extLst>
+          </p:cNvPr>
+          <p:cNvSpPr/>
+          <p:nvPr/>
+        </p:nvSpPr>
+        <p:spPr>
+          <a:xfrm rot="10800000">
+            <a:off x="4251992" y="5130212"/>
+            <a:ext cx="97166" cy="696539"/>
+          </a:xfrm>
+          <a:prstGeom prst="downArrow">
+            <a:avLst/>
+          </a:prstGeom>
+          <a:solidFill>
+            <a:srgbClr val="FF0000"/>
+          </a:solidFill>
+        </p:spPr>
+        <p:style>
+          <a:lnRef idx="2">
+            <a:schemeClr val="accent1">
+              <a:shade val="50000"/>
+            </a:schemeClr>
+          </a:lnRef>
+          <a:fillRef idx="1">
+            <a:schemeClr val="accent1"/>
+          </a:fillRef>
+          <a:effectRef idx="0">
+            <a:schemeClr val="accent1"/>
+          </a:effectRef>
+          <a:fontRef idx="minor">
+            <a:schemeClr val="lt1"/>
+          </a:fontRef>
+        </p:style>
+        <p:txBody>
+          <a:bodyPr rtlCol="0" anchor="ctr"/>
+          <a:lstStyle/>
+          <a:p>
+            <a:pPr algn="ctr"/>
+            <a:endParaRPr lang="en-US">
+              <a:solidFill>
+                <a:srgbClr val="FF0000"/>
+              </a:solidFill>
+            </a:endParaRPr>
+          </a:p>
+        </p:txBody>
+      </p:sp>
+      <p:sp>
+        <p:nvSpPr>
+          <p:cNvPr id="19" name="Rectangle 18">
+            <a:extLst>
+              <a:ext uri="{FF2B5EF4-FFF2-40B4-BE49-F238E27FC236}">
+                <a16:creationId xmlns:a16="http://schemas.microsoft.com/office/drawing/2014/main" id="{72049E91-45C0-421F-B119-9ECD16D27864}"/>
+              </a:ext>
+            </a:extLst>
+          </p:cNvPr>
+          <p:cNvSpPr/>
+          <p:nvPr/>
+        </p:nvSpPr>
+        <p:spPr>
+          <a:xfrm>
+            <a:off x="6713287" y="4095591"/>
+            <a:ext cx="5379075" cy="2484200"/>
           </a:xfrm>
           <a:prstGeom prst="rect">
             <a:avLst/>
@@ -8406,62 +9385,307 @@
           <a:lstStyle/>
           <a:p>
             <a:r>
-              <a:rPr lang="en-US" dirty="0"/>
-              <a:t>   </a:t>
-            </a:r>
-          </a:p>
-          <a:p>
-            <a:r>
-              <a:rPr lang="en-US" dirty="0" err="1"/>
-              <a:t>model.compile</a:t>
-            </a:r>
-            <a:r>
-              <a:rPr lang="en-US" dirty="0"/>
-              <a:t>(optimizer=‘</a:t>
-            </a:r>
-            <a:r>
-              <a:rPr lang="en-US" dirty="0" err="1"/>
-              <a:t>sgd</a:t>
-            </a:r>
-            <a:r>
-              <a:rPr lang="en-US" dirty="0"/>
-              <a:t>’, loss=‘</a:t>
-            </a:r>
-            <a:r>
-              <a:rPr lang="en-US" dirty="0" err="1"/>
-              <a:t>categorical_crossentropy</a:t>
-            </a:r>
-            <a:r>
-              <a:rPr lang="en-US" dirty="0"/>
-              <a:t>’, metrics=[‘accuracy’]</a:t>
-            </a:r>
-          </a:p>
-          <a:p>
-            <a:endParaRPr lang="en-US" dirty="0"/>
-          </a:p>
-          <a:p>
-            <a:r>
-              <a:rPr lang="en-US" dirty="0"/>
-              <a:t> </a:t>
-            </a:r>
-            <a:r>
-              <a:rPr lang="en-US" dirty="0" err="1"/>
-              <a:t>model.summary</a:t>
-            </a:r>
-            <a:r>
-              <a:rPr lang="en-US" dirty="0"/>
-              <a:t>()</a:t>
-            </a:r>
-          </a:p>
-          <a:p>
-            <a:endParaRPr lang="en-US" sz="2400" dirty="0"/>
+              <a:rPr lang="en-US" sz="1500" dirty="0" err="1"/>
+              <a:t>model.add</a:t>
+            </a:r>
+            <a:r>
+              <a:rPr lang="en-US" sz="1500" dirty="0"/>
+              <a:t>(Conv2D(64, </a:t>
+            </a:r>
+            <a:r>
+              <a:rPr lang="en-US" sz="1500" dirty="0" err="1"/>
+              <a:t>kernel_size</a:t>
+            </a:r>
+            <a:r>
+              <a:rPr lang="en-US" sz="1500" dirty="0"/>
+              <a:t>=(3,3), activation= ‘</a:t>
+            </a:r>
+            <a:r>
+              <a:rPr lang="en-US" sz="1500" dirty="0" err="1"/>
+              <a:t>relu</a:t>
+            </a:r>
+            <a:r>
+              <a:rPr lang="en-US" sz="1500" dirty="0"/>
+              <a:t>’, </a:t>
+            </a:r>
+            <a:r>
+              <a:rPr lang="en-US" sz="1500" dirty="0" err="1"/>
+              <a:t>input_shape</a:t>
+            </a:r>
+            <a:r>
+              <a:rPr lang="en-US" sz="1500" dirty="0"/>
+              <a:t>())</a:t>
+            </a:r>
+          </a:p>
+          <a:p>
+            <a:endParaRPr lang="en-US" sz="1500" dirty="0"/>
+          </a:p>
+          <a:p>
+            <a:r>
+              <a:rPr lang="en-US" sz="1500" dirty="0" err="1"/>
+              <a:t>model.add</a:t>
+            </a:r>
+            <a:r>
+              <a:rPr lang="en-US" sz="1500" dirty="0"/>
+              <a:t>(Conv2D(64, </a:t>
+            </a:r>
+            <a:r>
+              <a:rPr lang="en-US" sz="1500" dirty="0" err="1"/>
+              <a:t>kernel_size</a:t>
+            </a:r>
+            <a:r>
+              <a:rPr lang="en-US" sz="1500" dirty="0"/>
+              <a:t>=(3,3), activation= ‘</a:t>
+            </a:r>
+            <a:r>
+              <a:rPr lang="en-US" sz="1500" dirty="0" err="1"/>
+              <a:t>relu</a:t>
+            </a:r>
+            <a:r>
+              <a:rPr lang="en-US" sz="1500" dirty="0"/>
+              <a:t>’)</a:t>
+            </a:r>
+          </a:p>
+          <a:p>
+            <a:endParaRPr lang="en-US" sz="1500" dirty="0">
+              <a:solidFill>
+                <a:schemeClr val="bg1"/>
+              </a:solidFill>
+            </a:endParaRPr>
+          </a:p>
+          <a:p>
+            <a:r>
+              <a:rPr lang="en-US" sz="1500" dirty="0" err="1">
+                <a:solidFill>
+                  <a:schemeClr val="bg1"/>
+                </a:solidFill>
+                <a:latin typeface="Calibri" panose="020F0502020204030204" pitchFamily="34" charset="0"/>
+                <a:cs typeface="Calibri" panose="020F0502020204030204" pitchFamily="34" charset="0"/>
+              </a:rPr>
+              <a:t>model.add</a:t>
+            </a:r>
+            <a:r>
+              <a:rPr lang="en-US" sz="1500" dirty="0">
+                <a:solidFill>
+                  <a:schemeClr val="bg1"/>
+                </a:solidFill>
+                <a:latin typeface="Calibri" panose="020F0502020204030204" pitchFamily="34" charset="0"/>
+                <a:cs typeface="Calibri" panose="020F0502020204030204" pitchFamily="34" charset="0"/>
+              </a:rPr>
+              <a:t>(Dense(</a:t>
+            </a:r>
+            <a:r>
+              <a:rPr lang="en-US" sz="1500" dirty="0" err="1">
+                <a:solidFill>
+                  <a:schemeClr val="bg1"/>
+                </a:solidFill>
+                <a:latin typeface="Calibri" panose="020F0502020204030204" pitchFamily="34" charset="0"/>
+                <a:cs typeface="Calibri" panose="020F0502020204030204" pitchFamily="34" charset="0"/>
+              </a:rPr>
+              <a:t>num_nodes</a:t>
+            </a:r>
+            <a:r>
+              <a:rPr lang="en-US" sz="1500" dirty="0">
+                <a:solidFill>
+                  <a:schemeClr val="bg1"/>
+                </a:solidFill>
+                <a:latin typeface="Calibri" panose="020F0502020204030204" pitchFamily="34" charset="0"/>
+                <a:cs typeface="Calibri" panose="020F0502020204030204" pitchFamily="34" charset="0"/>
+              </a:rPr>
+              <a:t>, activation = ‘</a:t>
+            </a:r>
+            <a:r>
+              <a:rPr lang="en-US" sz="1500" dirty="0" err="1">
+                <a:solidFill>
+                  <a:schemeClr val="bg1"/>
+                </a:solidFill>
+                <a:latin typeface="Calibri" panose="020F0502020204030204" pitchFamily="34" charset="0"/>
+                <a:cs typeface="Calibri" panose="020F0502020204030204" pitchFamily="34" charset="0"/>
+              </a:rPr>
+              <a:t>relu</a:t>
+            </a:r>
+            <a:r>
+              <a:rPr lang="en-US" sz="1500" dirty="0">
+                <a:solidFill>
+                  <a:schemeClr val="bg1"/>
+                </a:solidFill>
+                <a:latin typeface="Calibri" panose="020F0502020204030204" pitchFamily="34" charset="0"/>
+                <a:cs typeface="Calibri" panose="020F0502020204030204" pitchFamily="34" charset="0"/>
+              </a:rPr>
+              <a:t>’))</a:t>
+            </a:r>
+          </a:p>
+          <a:p>
+            <a:endParaRPr lang="en-US" sz="1500" dirty="0">
+              <a:solidFill>
+                <a:schemeClr val="bg1"/>
+              </a:solidFill>
+              <a:latin typeface="Calibri" panose="020F0502020204030204" pitchFamily="34" charset="0"/>
+              <a:cs typeface="Calibri" panose="020F0502020204030204" pitchFamily="34" charset="0"/>
+            </a:endParaRPr>
+          </a:p>
+          <a:p>
+            <a:r>
+              <a:rPr lang="en-US" sz="1500" dirty="0" err="1">
+                <a:solidFill>
+                  <a:schemeClr val="bg1"/>
+                </a:solidFill>
+              </a:rPr>
+              <a:t>model.add</a:t>
+            </a:r>
+            <a:r>
+              <a:rPr lang="en-US" sz="1500" dirty="0">
+                <a:solidFill>
+                  <a:schemeClr val="bg1"/>
+                </a:solidFill>
+              </a:rPr>
+              <a:t>(Dense(</a:t>
+            </a:r>
+            <a:r>
+              <a:rPr lang="en-US" sz="1500" dirty="0" err="1">
+                <a:solidFill>
+                  <a:schemeClr val="bg1"/>
+                </a:solidFill>
+              </a:rPr>
+              <a:t>num_classes</a:t>
+            </a:r>
+            <a:r>
+              <a:rPr lang="en-US" sz="1500" dirty="0">
+                <a:solidFill>
+                  <a:schemeClr val="bg1"/>
+                </a:solidFill>
+              </a:rPr>
+              <a:t>, activation=‘</a:t>
+            </a:r>
+            <a:r>
+              <a:rPr lang="en-US" sz="1500" dirty="0" err="1">
+                <a:solidFill>
+                  <a:schemeClr val="bg1"/>
+                </a:solidFill>
+              </a:rPr>
+              <a:t>softmax</a:t>
+            </a:r>
+            <a:r>
+              <a:rPr lang="en-US" sz="1500" dirty="0">
+                <a:solidFill>
+                  <a:schemeClr val="bg1"/>
+                </a:solidFill>
+              </a:rPr>
+              <a:t>’))</a:t>
+            </a:r>
+          </a:p>
+        </p:txBody>
+      </p:sp>
+      <p:sp>
+        <p:nvSpPr>
+          <p:cNvPr id="20" name="Arrow: Down 19">
+            <a:extLst>
+              <a:ext uri="{FF2B5EF4-FFF2-40B4-BE49-F238E27FC236}">
+                <a16:creationId xmlns:a16="http://schemas.microsoft.com/office/drawing/2014/main" id="{0AA38E0D-FD32-484B-8A56-4EDD0C721E3A}"/>
+              </a:ext>
+            </a:extLst>
+          </p:cNvPr>
+          <p:cNvSpPr/>
+          <p:nvPr/>
+        </p:nvSpPr>
+        <p:spPr>
+          <a:xfrm>
+            <a:off x="8259189" y="902726"/>
+            <a:ext cx="97166" cy="696539"/>
+          </a:xfrm>
+          <a:prstGeom prst="downArrow">
+            <a:avLst/>
+          </a:prstGeom>
+          <a:solidFill>
+            <a:srgbClr val="FF0000"/>
+          </a:solidFill>
+        </p:spPr>
+        <p:style>
+          <a:lnRef idx="2">
+            <a:schemeClr val="accent1">
+              <a:shade val="50000"/>
+            </a:schemeClr>
+          </a:lnRef>
+          <a:fillRef idx="1">
+            <a:schemeClr val="accent1"/>
+          </a:fillRef>
+          <a:effectRef idx="0">
+            <a:schemeClr val="accent1"/>
+          </a:effectRef>
+          <a:fontRef idx="minor">
+            <a:schemeClr val="lt1"/>
+          </a:fontRef>
+        </p:style>
+        <p:txBody>
+          <a:bodyPr rtlCol="0" anchor="ctr"/>
+          <a:lstStyle/>
+          <a:p>
+            <a:pPr algn="ctr"/>
+            <a:endParaRPr lang="en-US">
+              <a:solidFill>
+                <a:srgbClr val="FF0000"/>
+              </a:solidFill>
+            </a:endParaRPr>
+          </a:p>
+        </p:txBody>
+      </p:sp>
+      <p:sp>
+        <p:nvSpPr>
+          <p:cNvPr id="24" name="Arrow: Down 23">
+            <a:extLst>
+              <a:ext uri="{FF2B5EF4-FFF2-40B4-BE49-F238E27FC236}">
+                <a16:creationId xmlns:a16="http://schemas.microsoft.com/office/drawing/2014/main" id="{138FD3A0-1EEA-421D-9B10-11173C0ADF8C}"/>
+              </a:ext>
+            </a:extLst>
+          </p:cNvPr>
+          <p:cNvSpPr/>
+          <p:nvPr/>
+        </p:nvSpPr>
+        <p:spPr>
+          <a:xfrm rot="15499172" flipH="1">
+            <a:off x="7245325" y="4193428"/>
+            <a:ext cx="97406" cy="2987817"/>
+          </a:xfrm>
+          <a:prstGeom prst="downArrow">
+            <a:avLst/>
+          </a:prstGeom>
+          <a:solidFill>
+            <a:srgbClr val="FF0000"/>
+          </a:solidFill>
+        </p:spPr>
+        <p:style>
+          <a:lnRef idx="2">
+            <a:schemeClr val="accent1">
+              <a:shade val="50000"/>
+            </a:schemeClr>
+          </a:lnRef>
+          <a:fillRef idx="1">
+            <a:schemeClr val="accent1"/>
+          </a:fillRef>
+          <a:effectRef idx="0">
+            <a:schemeClr val="accent1"/>
+          </a:effectRef>
+          <a:fontRef idx="minor">
+            <a:schemeClr val="lt1"/>
+          </a:fontRef>
+        </p:style>
+        <p:txBody>
+          <a:bodyPr rtlCol="0" anchor="ctr"/>
+          <a:lstStyle/>
+          <a:p>
+            <a:pPr algn="ctr"/>
+            <a:endParaRPr lang="en-US">
+              <a:solidFill>
+                <a:srgbClr val="FF0000"/>
+              </a:solidFill>
+            </a:endParaRPr>
           </a:p>
         </p:txBody>
       </p:sp>
     </p:spTree>
     <p:extLst>
       <p:ext uri="{BB962C8B-B14F-4D97-AF65-F5344CB8AC3E}">
-        <p14:creationId xmlns:p14="http://schemas.microsoft.com/office/powerpoint/2010/main" val="3916580449"/>
+        <p14:creationId xmlns:p14="http://schemas.microsoft.com/office/powerpoint/2010/main" val="3115944502"/>
       </p:ext>
     </p:extLst>
   </p:cSld>
@@ -8579,7 +9803,7 @@
         </p:nvSpPr>
         <p:spPr>
           <a:xfrm>
-            <a:off x="838200" y="320040"/>
+            <a:off x="744644" y="601661"/>
             <a:ext cx="3494362" cy="4930246"/>
           </a:xfrm>
         </p:spPr>
@@ -8596,7 +9820,7 @@
                   <a:schemeClr val="accent1"/>
                 </a:solidFill>
               </a:rPr>
-              <a:t>Train a model</a:t>
+              <a:t>Compile a model</a:t>
             </a:r>
           </a:p>
         </p:txBody>
@@ -8658,10 +9882,146 @@
       </p:cxnSp>
       <p:sp>
         <p:nvSpPr>
-          <p:cNvPr id="9" name="Rectangle 8">
-            <a:extLst>
-              <a:ext uri="{FF2B5EF4-FFF2-40B4-BE49-F238E27FC236}">
-                <a16:creationId xmlns:a16="http://schemas.microsoft.com/office/drawing/2014/main" id="{E8D235DA-F106-4021-A1E4-A31C4B2376B6}"/>
+          <p:cNvPr id="3" name="Content Placeholder 2">
+            <a:extLst>
+              <a:ext uri="{FF2B5EF4-FFF2-40B4-BE49-F238E27FC236}">
+                <a16:creationId xmlns:a16="http://schemas.microsoft.com/office/drawing/2014/main" id="{D5E9B993-44AB-4870-BBA8-A1A97A055BF8}"/>
+              </a:ext>
+            </a:extLst>
+          </p:cNvPr>
+          <p:cNvSpPr>
+            <a:spLocks noGrp="1"/>
+          </p:cNvSpPr>
+          <p:nvPr>
+            <p:ph idx="1"/>
+          </p:nvPr>
+        </p:nvSpPr>
+        <p:spPr>
+          <a:xfrm>
+            <a:off x="4849198" y="454079"/>
+            <a:ext cx="7021237" cy="4628569"/>
+          </a:xfrm>
+        </p:spPr>
+        <p:txBody>
+          <a:bodyPr anchor="ctr">
+            <a:normAutofit/>
+          </a:bodyPr>
+          <a:lstStyle/>
+          <a:p>
+            <a:r>
+              <a:rPr lang="en-US" sz="2400" dirty="0"/>
+              <a:t>Optimizers</a:t>
+            </a:r>
+          </a:p>
+          <a:p>
+            <a:pPr lvl="1"/>
+            <a:r>
+              <a:rPr lang="en-US" sz="2000" dirty="0"/>
+              <a:t>Controls the learning rate</a:t>
+            </a:r>
+          </a:p>
+          <a:p>
+            <a:pPr lvl="1"/>
+            <a:r>
+              <a:rPr lang="en-US" sz="2000" dirty="0"/>
+              <a:t>Lots of options  </a:t>
+            </a:r>
+          </a:p>
+          <a:p>
+            <a:pPr lvl="1"/>
+            <a:r>
+              <a:rPr lang="en-US" sz="2000" dirty="0"/>
+              <a:t>Common choices: Adam, Stochastic gradient descent (SGD) </a:t>
+            </a:r>
+          </a:p>
+          <a:p>
+            <a:r>
+              <a:rPr lang="en-US" sz="2400" dirty="0"/>
+              <a:t>Loss functions</a:t>
+            </a:r>
+          </a:p>
+          <a:p>
+            <a:pPr lvl="1"/>
+            <a:r>
+              <a:rPr lang="en-US" sz="2000" dirty="0">
+                <a:latin typeface="Calibri" panose="020F0502020204030204" pitchFamily="34" charset="0"/>
+                <a:cs typeface="Calibri" panose="020F0502020204030204" pitchFamily="34" charset="0"/>
+              </a:rPr>
+              <a:t>Lots of options</a:t>
+            </a:r>
+          </a:p>
+          <a:p>
+            <a:pPr lvl="1"/>
+            <a:r>
+              <a:rPr lang="en-US" sz="2000" dirty="0">
+                <a:latin typeface="Calibri" panose="020F0502020204030204" pitchFamily="34" charset="0"/>
+                <a:cs typeface="Calibri" panose="020F0502020204030204" pitchFamily="34" charset="0"/>
+              </a:rPr>
+              <a:t>Common choices: </a:t>
+            </a:r>
+            <a:r>
+              <a:rPr lang="en-US" sz="2000" i="1" dirty="0" err="1">
+                <a:latin typeface="Calibri" panose="020F0502020204030204" pitchFamily="34" charset="0"/>
+                <a:cs typeface="Calibri" panose="020F0502020204030204" pitchFamily="34" charset="0"/>
+              </a:rPr>
+              <a:t>mean_squared_error</a:t>
+            </a:r>
+            <a:r>
+              <a:rPr lang="en-US" sz="2000" i="1" dirty="0">
+                <a:latin typeface="Calibri" panose="020F0502020204030204" pitchFamily="34" charset="0"/>
+                <a:cs typeface="Calibri" panose="020F0502020204030204" pitchFamily="34" charset="0"/>
+              </a:rPr>
+              <a:t> </a:t>
+            </a:r>
+            <a:r>
+              <a:rPr lang="en-US" sz="2000" dirty="0">
+                <a:latin typeface="Calibri" panose="020F0502020204030204" pitchFamily="34" charset="0"/>
+                <a:cs typeface="Calibri" panose="020F0502020204030204" pitchFamily="34" charset="0"/>
+              </a:rPr>
+              <a:t>for regression and </a:t>
+            </a:r>
+            <a:r>
+              <a:rPr lang="en-US" sz="2000" i="1" dirty="0" err="1">
+                <a:latin typeface="Calibri" panose="020F0502020204030204" pitchFamily="34" charset="0"/>
+                <a:cs typeface="Calibri" panose="020F0502020204030204" pitchFamily="34" charset="0"/>
+              </a:rPr>
+              <a:t>categorical_crossentropy</a:t>
+            </a:r>
+            <a:r>
+              <a:rPr lang="en-US" sz="2000" i="1" dirty="0">
+                <a:latin typeface="Calibri" panose="020F0502020204030204" pitchFamily="34" charset="0"/>
+                <a:cs typeface="Calibri" panose="020F0502020204030204" pitchFamily="34" charset="0"/>
+              </a:rPr>
+              <a:t> </a:t>
+            </a:r>
+            <a:r>
+              <a:rPr lang="en-US" sz="2000" dirty="0">
+                <a:latin typeface="Calibri" panose="020F0502020204030204" pitchFamily="34" charset="0"/>
+                <a:cs typeface="Calibri" panose="020F0502020204030204" pitchFamily="34" charset="0"/>
+              </a:rPr>
+              <a:t>for classification</a:t>
+            </a:r>
+          </a:p>
+          <a:p>
+            <a:r>
+              <a:rPr lang="en-US" sz="2400" dirty="0"/>
+              <a:t>Metrics</a:t>
+            </a:r>
+          </a:p>
+          <a:p>
+            <a:r>
+              <a:rPr lang="en-US" sz="2400" dirty="0"/>
+              <a:t>Review model summary</a:t>
+            </a:r>
+          </a:p>
+        </p:txBody>
+      </p:sp>
+      <p:sp>
+        <p:nvSpPr>
+          <p:cNvPr id="7" name="Rectangle 6">
+            <a:extLst>
+              <a:ext uri="{FF2B5EF4-FFF2-40B4-BE49-F238E27FC236}">
+                <a16:creationId xmlns:a16="http://schemas.microsoft.com/office/drawing/2014/main" id="{50D33E55-670C-4406-96D9-539EE0DF19ED}"/>
               </a:ext>
             </a:extLst>
           </p:cNvPr>
@@ -8670,8 +10030,8 @@
         </p:nvSpPr>
         <p:spPr>
           <a:xfrm>
-            <a:off x="5066272" y="2068189"/>
-            <a:ext cx="6392188" cy="2539840"/>
+            <a:off x="1281181" y="4981746"/>
+            <a:ext cx="8655839" cy="1435683"/>
           </a:xfrm>
           <a:prstGeom prst="rect">
             <a:avLst/>
@@ -8697,296 +10057,63 @@
           <a:bodyPr rtlCol="0" anchor="ctr"/>
           <a:lstStyle/>
           <a:p>
-            <a:endParaRPr lang="en-US" dirty="0">
-              <a:solidFill>
-                <a:schemeClr val="bg1"/>
-              </a:solidFill>
-              <a:latin typeface="Calibri" panose="020F0502020204030204" pitchFamily="34" charset="0"/>
-              <a:cs typeface="Calibri" panose="020F0502020204030204" pitchFamily="34" charset="0"/>
-            </a:endParaRPr>
-          </a:p>
-          <a:p>
-            <a:endParaRPr lang="en-US" dirty="0">
-              <a:solidFill>
-                <a:schemeClr val="bg1"/>
-              </a:solidFill>
-              <a:latin typeface="Calibri" panose="020F0502020204030204" pitchFamily="34" charset="0"/>
-              <a:cs typeface="Calibri" panose="020F0502020204030204" pitchFamily="34" charset="0"/>
-            </a:endParaRPr>
-          </a:p>
-          <a:p>
-            <a:r>
-              <a:rPr lang="en-US" dirty="0" err="1">
-                <a:solidFill>
-                  <a:schemeClr val="bg1"/>
-                </a:solidFill>
-                <a:latin typeface="Calibri" panose="020F0502020204030204" pitchFamily="34" charset="0"/>
-                <a:cs typeface="Calibri" panose="020F0502020204030204" pitchFamily="34" charset="0"/>
-              </a:rPr>
-              <a:t>model.fit</a:t>
-            </a:r>
-            <a:r>
-              <a:rPr lang="en-US" dirty="0">
-                <a:solidFill>
-                  <a:schemeClr val="bg1"/>
-                </a:solidFill>
-                <a:latin typeface="Calibri" panose="020F0502020204030204" pitchFamily="34" charset="0"/>
-                <a:cs typeface="Calibri" panose="020F0502020204030204" pitchFamily="34" charset="0"/>
-              </a:rPr>
-              <a:t>(predictors, target)</a:t>
-            </a:r>
-          </a:p>
-          <a:p>
-            <a:endParaRPr lang="en-US" dirty="0">
-              <a:solidFill>
-                <a:schemeClr val="bg1"/>
-              </a:solidFill>
-              <a:latin typeface="Calibri" panose="020F0502020204030204" pitchFamily="34" charset="0"/>
-              <a:cs typeface="Calibri" panose="020F0502020204030204" pitchFamily="34" charset="0"/>
-            </a:endParaRPr>
-          </a:p>
-          <a:p>
-            <a:r>
-              <a:rPr lang="en-US" dirty="0" err="1">
-                <a:solidFill>
-                  <a:schemeClr val="bg1"/>
-                </a:solidFill>
-                <a:latin typeface="Calibri" panose="020F0502020204030204" pitchFamily="34" charset="0"/>
-                <a:cs typeface="Calibri" panose="020F0502020204030204" pitchFamily="34" charset="0"/>
-              </a:rPr>
-              <a:t>model.fit</a:t>
-            </a:r>
-            <a:r>
-              <a:rPr lang="en-US" dirty="0">
-                <a:solidFill>
-                  <a:schemeClr val="bg1"/>
-                </a:solidFill>
-                <a:latin typeface="Calibri" panose="020F0502020204030204" pitchFamily="34" charset="0"/>
-                <a:cs typeface="Calibri" panose="020F0502020204030204" pitchFamily="34" charset="0"/>
-              </a:rPr>
-              <a:t>(</a:t>
-            </a:r>
-            <a:r>
-              <a:rPr lang="en-US" dirty="0" err="1">
-                <a:solidFill>
-                  <a:schemeClr val="bg1"/>
-                </a:solidFill>
-                <a:latin typeface="Calibri" panose="020F0502020204030204" pitchFamily="34" charset="0"/>
-                <a:cs typeface="Calibri" panose="020F0502020204030204" pitchFamily="34" charset="0"/>
-              </a:rPr>
-              <a:t>X_train</a:t>
-            </a:r>
-            <a:r>
-              <a:rPr lang="en-US" dirty="0">
-                <a:solidFill>
-                  <a:schemeClr val="bg1"/>
-                </a:solidFill>
-                <a:latin typeface="Calibri" panose="020F0502020204030204" pitchFamily="34" charset="0"/>
-                <a:cs typeface="Calibri" panose="020F0502020204030204" pitchFamily="34" charset="0"/>
-              </a:rPr>
-              <a:t>, </a:t>
-            </a:r>
-            <a:r>
-              <a:rPr lang="en-US" dirty="0" err="1">
-                <a:solidFill>
-                  <a:schemeClr val="bg1"/>
-                </a:solidFill>
-                <a:latin typeface="Calibri" panose="020F0502020204030204" pitchFamily="34" charset="0"/>
-                <a:cs typeface="Calibri" panose="020F0502020204030204" pitchFamily="34" charset="0"/>
-              </a:rPr>
-              <a:t>Y_train</a:t>
-            </a:r>
-            <a:r>
-              <a:rPr lang="en-US" dirty="0">
-                <a:solidFill>
-                  <a:schemeClr val="bg1"/>
-                </a:solidFill>
-                <a:latin typeface="Calibri" panose="020F0502020204030204" pitchFamily="34" charset="0"/>
-                <a:cs typeface="Calibri" panose="020F0502020204030204" pitchFamily="34" charset="0"/>
-              </a:rPr>
-              <a:t>, </a:t>
-            </a:r>
-            <a:r>
-              <a:rPr lang="en-US" dirty="0" err="1">
-                <a:solidFill>
-                  <a:schemeClr val="bg1"/>
-                </a:solidFill>
-                <a:latin typeface="Calibri" panose="020F0502020204030204" pitchFamily="34" charset="0"/>
-                <a:cs typeface="Calibri" panose="020F0502020204030204" pitchFamily="34" charset="0"/>
-              </a:rPr>
-              <a:t>batch_size</a:t>
-            </a:r>
-            <a:r>
-              <a:rPr lang="en-US" dirty="0">
-                <a:solidFill>
-                  <a:schemeClr val="bg1"/>
-                </a:solidFill>
-                <a:latin typeface="Calibri" panose="020F0502020204030204" pitchFamily="34" charset="0"/>
-                <a:cs typeface="Calibri" panose="020F0502020204030204" pitchFamily="34" charset="0"/>
-              </a:rPr>
-              <a:t>=128, epochs=20, </a:t>
-            </a:r>
-          </a:p>
-          <a:p>
-            <a:r>
-              <a:rPr lang="en-US" dirty="0">
-                <a:solidFill>
-                  <a:schemeClr val="bg1"/>
-                </a:solidFill>
-                <a:latin typeface="Calibri" panose="020F0502020204030204" pitchFamily="34" charset="0"/>
-                <a:cs typeface="Calibri" panose="020F0502020204030204" pitchFamily="34" charset="0"/>
-              </a:rPr>
-              <a:t>       verbose=1, </a:t>
-            </a:r>
-            <a:r>
-              <a:rPr lang="en-US" dirty="0" err="1">
-                <a:solidFill>
-                  <a:schemeClr val="bg1"/>
-                </a:solidFill>
-                <a:latin typeface="Calibri" panose="020F0502020204030204" pitchFamily="34" charset="0"/>
-                <a:cs typeface="Calibri" panose="020F0502020204030204" pitchFamily="34" charset="0"/>
-              </a:rPr>
-              <a:t>validation_data</a:t>
-            </a:r>
-            <a:r>
-              <a:rPr lang="en-US" dirty="0">
-                <a:solidFill>
-                  <a:schemeClr val="bg1"/>
-                </a:solidFill>
-                <a:latin typeface="Calibri" panose="020F0502020204030204" pitchFamily="34" charset="0"/>
-                <a:cs typeface="Calibri" panose="020F0502020204030204" pitchFamily="34" charset="0"/>
-              </a:rPr>
-              <a:t>=(</a:t>
-            </a:r>
-            <a:r>
-              <a:rPr lang="en-US" dirty="0" err="1">
-                <a:solidFill>
-                  <a:schemeClr val="bg1"/>
-                </a:solidFill>
-                <a:latin typeface="Calibri" panose="020F0502020204030204" pitchFamily="34" charset="0"/>
-                <a:cs typeface="Calibri" panose="020F0502020204030204" pitchFamily="34" charset="0"/>
-              </a:rPr>
-              <a:t>X_test</a:t>
-            </a:r>
-            <a:r>
-              <a:rPr lang="en-US" dirty="0">
-                <a:solidFill>
-                  <a:schemeClr val="bg1"/>
-                </a:solidFill>
-                <a:latin typeface="Calibri" panose="020F0502020204030204" pitchFamily="34" charset="0"/>
-                <a:cs typeface="Calibri" panose="020F0502020204030204" pitchFamily="34" charset="0"/>
-              </a:rPr>
-              <a:t>, </a:t>
-            </a:r>
-            <a:r>
-              <a:rPr lang="en-US" dirty="0" err="1">
-                <a:solidFill>
-                  <a:schemeClr val="bg1"/>
-                </a:solidFill>
-                <a:latin typeface="Calibri" panose="020F0502020204030204" pitchFamily="34" charset="0"/>
-                <a:cs typeface="Calibri" panose="020F0502020204030204" pitchFamily="34" charset="0"/>
-              </a:rPr>
-              <a:t>Y_test</a:t>
-            </a:r>
-            <a:r>
-              <a:rPr lang="en-US" dirty="0">
-                <a:solidFill>
-                  <a:schemeClr val="bg1"/>
-                </a:solidFill>
-                <a:latin typeface="Calibri" panose="020F0502020204030204" pitchFamily="34" charset="0"/>
-                <a:cs typeface="Calibri" panose="020F0502020204030204" pitchFamily="34" charset="0"/>
-              </a:rPr>
-              <a:t>), </a:t>
-            </a:r>
-          </a:p>
-          <a:p>
-            <a:r>
-              <a:rPr lang="en-US" dirty="0">
-                <a:solidFill>
-                  <a:schemeClr val="bg1"/>
-                </a:solidFill>
-                <a:latin typeface="Calibri" panose="020F0502020204030204" pitchFamily="34" charset="0"/>
-                <a:cs typeface="Calibri" panose="020F0502020204030204" pitchFamily="34" charset="0"/>
-              </a:rPr>
-              <a:t>       callbacks=</a:t>
-            </a:r>
-          </a:p>
-          <a:p>
-            <a:r>
-              <a:rPr lang="en-US" dirty="0">
-                <a:solidFill>
-                  <a:schemeClr val="bg1"/>
-                </a:solidFill>
-                <a:latin typeface="Calibri" panose="020F0502020204030204" pitchFamily="34" charset="0"/>
-                <a:cs typeface="Calibri" panose="020F0502020204030204" pitchFamily="34" charset="0"/>
-              </a:rPr>
-              <a:t>       [</a:t>
-            </a:r>
-            <a:r>
-              <a:rPr lang="en-US" dirty="0" err="1">
-                <a:solidFill>
-                  <a:schemeClr val="bg1"/>
-                </a:solidFill>
-                <a:latin typeface="Calibri" panose="020F0502020204030204" pitchFamily="34" charset="0"/>
-                <a:cs typeface="Calibri" panose="020F0502020204030204" pitchFamily="34" charset="0"/>
-              </a:rPr>
-              <a:t>EarlyStopping</a:t>
-            </a:r>
-            <a:r>
-              <a:rPr lang="en-US" dirty="0">
-                <a:solidFill>
-                  <a:schemeClr val="bg1"/>
-                </a:solidFill>
-                <a:latin typeface="Calibri" panose="020F0502020204030204" pitchFamily="34" charset="0"/>
-                <a:cs typeface="Calibri" panose="020F0502020204030204" pitchFamily="34" charset="0"/>
-              </a:rPr>
-              <a:t>(verbose=1, patience=5, monitor='</a:t>
-            </a:r>
-            <a:r>
-              <a:rPr lang="en-US" dirty="0" err="1">
-                <a:solidFill>
-                  <a:schemeClr val="bg1"/>
-                </a:solidFill>
-                <a:latin typeface="Calibri" panose="020F0502020204030204" pitchFamily="34" charset="0"/>
-                <a:cs typeface="Calibri" panose="020F0502020204030204" pitchFamily="34" charset="0"/>
-              </a:rPr>
-              <a:t>val_loss</a:t>
-            </a:r>
-            <a:r>
-              <a:rPr lang="en-US" dirty="0">
-                <a:solidFill>
-                  <a:schemeClr val="bg1"/>
-                </a:solidFill>
-                <a:latin typeface="Calibri" panose="020F0502020204030204" pitchFamily="34" charset="0"/>
-                <a:cs typeface="Calibri" panose="020F0502020204030204" pitchFamily="34" charset="0"/>
-              </a:rPr>
-              <a:t>’)])</a:t>
-            </a:r>
-          </a:p>
-          <a:p>
-            <a:endParaRPr lang="en-US" dirty="0">
-              <a:solidFill>
-                <a:schemeClr val="bg1"/>
-              </a:solidFill>
-              <a:latin typeface="Calibri" panose="020F0502020204030204" pitchFamily="34" charset="0"/>
-              <a:cs typeface="Calibri" panose="020F0502020204030204" pitchFamily="34" charset="0"/>
-            </a:endParaRPr>
-          </a:p>
-          <a:p>
-            <a:endParaRPr lang="en-US" sz="2400" dirty="0">
-              <a:solidFill>
-                <a:schemeClr val="bg1"/>
-              </a:solidFill>
-              <a:latin typeface="Calibri" panose="020F0502020204030204" pitchFamily="34" charset="0"/>
-              <a:cs typeface="Calibri" panose="020F0502020204030204" pitchFamily="34" charset="0"/>
-            </a:endParaRPr>
+            <a:r>
+              <a:rPr lang="en-US" dirty="0"/>
+              <a:t>   </a:t>
+            </a:r>
+          </a:p>
+          <a:p>
+            <a:r>
+              <a:rPr lang="en-US" dirty="0" err="1"/>
+              <a:t>model.compile</a:t>
+            </a:r>
+            <a:r>
+              <a:rPr lang="en-US" dirty="0"/>
+              <a:t>(optimizer=‘</a:t>
+            </a:r>
+            <a:r>
+              <a:rPr lang="en-US" dirty="0" err="1"/>
+              <a:t>sgd</a:t>
+            </a:r>
+            <a:r>
+              <a:rPr lang="en-US" dirty="0"/>
+              <a:t>’, loss=‘</a:t>
+            </a:r>
+            <a:r>
+              <a:rPr lang="en-US" dirty="0" err="1"/>
+              <a:t>categorical_crossentropy</a:t>
+            </a:r>
+            <a:r>
+              <a:rPr lang="en-US" dirty="0"/>
+              <a:t>’, metrics=[‘accuracy’]</a:t>
+            </a:r>
+          </a:p>
+          <a:p>
+            <a:endParaRPr lang="en-US" dirty="0"/>
+          </a:p>
+          <a:p>
+            <a:r>
+              <a:rPr lang="en-US" dirty="0"/>
+              <a:t> </a:t>
+            </a:r>
+            <a:r>
+              <a:rPr lang="en-US" dirty="0" err="1"/>
+              <a:t>model.summary</a:t>
+            </a:r>
+            <a:r>
+              <a:rPr lang="en-US" dirty="0"/>
+              <a:t>()</a:t>
+            </a:r>
+          </a:p>
+          <a:p>
+            <a:endParaRPr lang="en-US" sz="2400" dirty="0"/>
           </a:p>
         </p:txBody>
       </p:sp>
     </p:spTree>
     <p:extLst>
       <p:ext uri="{BB962C8B-B14F-4D97-AF65-F5344CB8AC3E}">
-        <p14:creationId xmlns:p14="http://schemas.microsoft.com/office/powerpoint/2010/main" val="168876672"/>
+        <p14:creationId xmlns:p14="http://schemas.microsoft.com/office/powerpoint/2010/main" val="3916580449"/>
       </p:ext>
     </p:extLst>
   </p:cSld>
@@ -9121,7 +10248,7 @@
                   <a:schemeClr val="accent1"/>
                 </a:solidFill>
               </a:rPr>
-              <a:t>Evaluate a model</a:t>
+              <a:t>Train a model</a:t>
             </a:r>
           </a:p>
         </p:txBody>
@@ -9183,10 +10310,10 @@
       </p:cxnSp>
       <p:sp>
         <p:nvSpPr>
-          <p:cNvPr id="7" name="Rectangle 6">
-            <a:extLst>
-              <a:ext uri="{FF2B5EF4-FFF2-40B4-BE49-F238E27FC236}">
-                <a16:creationId xmlns:a16="http://schemas.microsoft.com/office/drawing/2014/main" id="{EA66CCA0-77C8-4EF3-B112-6E5919359EFA}"/>
+          <p:cNvPr id="9" name="Rectangle 8">
+            <a:extLst>
+              <a:ext uri="{FF2B5EF4-FFF2-40B4-BE49-F238E27FC236}">
+                <a16:creationId xmlns:a16="http://schemas.microsoft.com/office/drawing/2014/main" id="{E8D235DA-F106-4021-A1E4-A31C4B2376B6}"/>
               </a:ext>
             </a:extLst>
           </p:cNvPr>
@@ -9195,8 +10322,8 @@
         </p:nvSpPr>
         <p:spPr>
           <a:xfrm>
-            <a:off x="5160113" y="1801565"/>
-            <a:ext cx="5687870" cy="2999035"/>
+            <a:off x="5066272" y="2068189"/>
+            <a:ext cx="6392188" cy="2539840"/>
           </a:xfrm>
           <a:prstGeom prst="rect">
             <a:avLst/>
@@ -9222,97 +10349,224 @@
           <a:bodyPr rtlCol="0" anchor="ctr"/>
           <a:lstStyle/>
           <a:p>
-            <a:r>
-              <a:rPr lang="en-US" sz="2000" dirty="0"/>
-              <a:t>score = </a:t>
-            </a:r>
-            <a:r>
-              <a:rPr lang="en-US" sz="2000" dirty="0" err="1"/>
-              <a:t>model.evaluate</a:t>
-            </a:r>
-            <a:r>
-              <a:rPr lang="en-US" sz="2000" dirty="0"/>
+            <a:endParaRPr lang="en-US" dirty="0">
+              <a:solidFill>
+                <a:schemeClr val="bg1"/>
+              </a:solidFill>
+              <a:latin typeface="Calibri" panose="020F0502020204030204" pitchFamily="34" charset="0"/>
+              <a:cs typeface="Calibri" panose="020F0502020204030204" pitchFamily="34" charset="0"/>
+            </a:endParaRPr>
+          </a:p>
+          <a:p>
+            <a:endParaRPr lang="en-US" dirty="0">
+              <a:solidFill>
+                <a:schemeClr val="bg1"/>
+              </a:solidFill>
+              <a:latin typeface="Calibri" panose="020F0502020204030204" pitchFamily="34" charset="0"/>
+              <a:cs typeface="Calibri" panose="020F0502020204030204" pitchFamily="34" charset="0"/>
+            </a:endParaRPr>
+          </a:p>
+          <a:p>
+            <a:r>
+              <a:rPr lang="en-US" dirty="0" err="1">
+                <a:solidFill>
+                  <a:schemeClr val="bg1"/>
+                </a:solidFill>
+                <a:latin typeface="Calibri" panose="020F0502020204030204" pitchFamily="34" charset="0"/>
+                <a:cs typeface="Calibri" panose="020F0502020204030204" pitchFamily="34" charset="0"/>
+              </a:rPr>
+              <a:t>model.fit</a:t>
+            </a:r>
+            <a:r>
+              <a:rPr lang="en-US" dirty="0">
+                <a:solidFill>
+                  <a:schemeClr val="bg1"/>
+                </a:solidFill>
+                <a:latin typeface="Calibri" panose="020F0502020204030204" pitchFamily="34" charset="0"/>
+                <a:cs typeface="Calibri" panose="020F0502020204030204" pitchFamily="34" charset="0"/>
+              </a:rPr>
+              <a:t>(predictors, target)</a:t>
+            </a:r>
+          </a:p>
+          <a:p>
+            <a:endParaRPr lang="en-US" dirty="0">
+              <a:solidFill>
+                <a:schemeClr val="bg1"/>
+              </a:solidFill>
+              <a:latin typeface="Calibri" panose="020F0502020204030204" pitchFamily="34" charset="0"/>
+              <a:cs typeface="Calibri" panose="020F0502020204030204" pitchFamily="34" charset="0"/>
+            </a:endParaRPr>
+          </a:p>
+          <a:p>
+            <a:r>
+              <a:rPr lang="en-US" dirty="0" err="1">
+                <a:solidFill>
+                  <a:schemeClr val="bg1"/>
+                </a:solidFill>
+                <a:latin typeface="Calibri" panose="020F0502020204030204" pitchFamily="34" charset="0"/>
+                <a:cs typeface="Calibri" panose="020F0502020204030204" pitchFamily="34" charset="0"/>
+              </a:rPr>
+              <a:t>model.fit</a:t>
+            </a:r>
+            <a:r>
+              <a:rPr lang="en-US" dirty="0">
+                <a:solidFill>
+                  <a:schemeClr val="bg1"/>
+                </a:solidFill>
+                <a:latin typeface="Calibri" panose="020F0502020204030204" pitchFamily="34" charset="0"/>
+                <a:cs typeface="Calibri" panose="020F0502020204030204" pitchFamily="34" charset="0"/>
+              </a:rPr>
               <a:t>(</a:t>
             </a:r>
             <a:r>
-              <a:rPr lang="en-US" sz="2000" dirty="0" err="1"/>
-              <a:t>X_test</a:t>
-            </a:r>
-            <a:r>
-              <a:rPr lang="en-US" sz="2000" dirty="0"/>
+              <a:rPr lang="en-US" dirty="0" err="1">
+                <a:solidFill>
+                  <a:schemeClr val="bg1"/>
+                </a:solidFill>
+                <a:latin typeface="Calibri" panose="020F0502020204030204" pitchFamily="34" charset="0"/>
+                <a:cs typeface="Calibri" panose="020F0502020204030204" pitchFamily="34" charset="0"/>
+              </a:rPr>
+              <a:t>X_train</a:t>
+            </a:r>
+            <a:r>
+              <a:rPr lang="en-US" dirty="0">
+                <a:solidFill>
+                  <a:schemeClr val="bg1"/>
+                </a:solidFill>
+                <a:latin typeface="Calibri" panose="020F0502020204030204" pitchFamily="34" charset="0"/>
+                <a:cs typeface="Calibri" panose="020F0502020204030204" pitchFamily="34" charset="0"/>
+              </a:rPr>
               <a:t>, </a:t>
             </a:r>
             <a:r>
-              <a:rPr lang="en-US" sz="2000" dirty="0" err="1"/>
-              <a:t>Y_test</a:t>
-            </a:r>
-            <a:r>
-              <a:rPr lang="en-US" sz="2000" dirty="0"/>
-              <a:t>, verbose=0)  </a:t>
-            </a:r>
-          </a:p>
-          <a:p>
-            <a:endParaRPr lang="en-US" sz="2000" dirty="0"/>
-          </a:p>
-          <a:p>
-            <a:r>
-              <a:rPr lang="en-US" sz="2000" dirty="0"/>
-              <a:t>Print (‘Test score:’, score[0])</a:t>
-            </a:r>
-          </a:p>
-          <a:p>
-            <a:r>
-              <a:rPr lang="en-US" sz="2000" dirty="0"/>
-              <a:t>Print(‘Test accuracy:’, score[1]</a:t>
-            </a:r>
-          </a:p>
-          <a:p>
-            <a:r>
-              <a:rPr lang="en-US" sz="2000" dirty="0"/>
-              <a:t>		</a:t>
-            </a:r>
-            <a:r>
-              <a:rPr lang="en-US" sz="1600" dirty="0"/>
-              <a:t>Test score: 0.14654441912919283</a:t>
-            </a:r>
-          </a:p>
-          <a:p>
-            <a:r>
-              <a:rPr lang="en-US" sz="1600" dirty="0"/>
-              <a:t>		Test accuracy: 0.9574  </a:t>
-            </a:r>
-          </a:p>
-          <a:p>
-            <a:endParaRPr lang="en-US" sz="2000" dirty="0"/>
-          </a:p>
-          <a:p>
-            <a:r>
-              <a:rPr lang="en-US" sz="2000" dirty="0"/>
-              <a:t>Predictions = </a:t>
-            </a:r>
-            <a:r>
-              <a:rPr lang="en-US" sz="2000" dirty="0" err="1"/>
-              <a:t>model.predict</a:t>
-            </a:r>
-            <a:r>
-              <a:rPr lang="en-US" sz="2000" dirty="0"/>
-              <a:t>(</a:t>
-            </a:r>
-            <a:r>
-              <a:rPr lang="en-US" sz="2000" dirty="0" err="1"/>
-              <a:t>new_data</a:t>
-            </a:r>
-            <a:r>
-              <a:rPr lang="en-US" sz="2000" dirty="0"/>
-              <a:t>)</a:t>
-            </a:r>
+              <a:rPr lang="en-US" dirty="0" err="1">
+                <a:solidFill>
+                  <a:schemeClr val="bg1"/>
+                </a:solidFill>
+                <a:latin typeface="Calibri" panose="020F0502020204030204" pitchFamily="34" charset="0"/>
+                <a:cs typeface="Calibri" panose="020F0502020204030204" pitchFamily="34" charset="0"/>
+              </a:rPr>
+              <a:t>Y_train</a:t>
+            </a:r>
+            <a:r>
+              <a:rPr lang="en-US" dirty="0">
+                <a:solidFill>
+                  <a:schemeClr val="bg1"/>
+                </a:solidFill>
+                <a:latin typeface="Calibri" panose="020F0502020204030204" pitchFamily="34" charset="0"/>
+                <a:cs typeface="Calibri" panose="020F0502020204030204" pitchFamily="34" charset="0"/>
+              </a:rPr>
+              <a:t>, </a:t>
+            </a:r>
+            <a:r>
+              <a:rPr lang="en-US" dirty="0" err="1">
+                <a:solidFill>
+                  <a:schemeClr val="bg1"/>
+                </a:solidFill>
+                <a:latin typeface="Calibri" panose="020F0502020204030204" pitchFamily="34" charset="0"/>
+                <a:cs typeface="Calibri" panose="020F0502020204030204" pitchFamily="34" charset="0"/>
+              </a:rPr>
+              <a:t>batch_size</a:t>
+            </a:r>
+            <a:r>
+              <a:rPr lang="en-US" dirty="0">
+                <a:solidFill>
+                  <a:schemeClr val="bg1"/>
+                </a:solidFill>
+                <a:latin typeface="Calibri" panose="020F0502020204030204" pitchFamily="34" charset="0"/>
+                <a:cs typeface="Calibri" panose="020F0502020204030204" pitchFamily="34" charset="0"/>
+              </a:rPr>
+              <a:t>=128, epochs=15, </a:t>
+            </a:r>
+          </a:p>
+          <a:p>
+            <a:r>
+              <a:rPr lang="en-US" dirty="0">
+                <a:solidFill>
+                  <a:schemeClr val="bg1"/>
+                </a:solidFill>
+                <a:latin typeface="Calibri" panose="020F0502020204030204" pitchFamily="34" charset="0"/>
+                <a:cs typeface="Calibri" panose="020F0502020204030204" pitchFamily="34" charset="0"/>
+              </a:rPr>
+              <a:t>       verbose=1,   callbacks=</a:t>
+            </a:r>
+          </a:p>
+          <a:p>
+            <a:r>
+              <a:rPr lang="en-US" dirty="0">
+                <a:solidFill>
+                  <a:schemeClr val="bg1"/>
+                </a:solidFill>
+                <a:latin typeface="Calibri" panose="020F0502020204030204" pitchFamily="34" charset="0"/>
+                <a:cs typeface="Calibri" panose="020F0502020204030204" pitchFamily="34" charset="0"/>
+              </a:rPr>
+              <a:t>       [</a:t>
+            </a:r>
+            <a:r>
+              <a:rPr lang="en-US" dirty="0" err="1">
+                <a:solidFill>
+                  <a:schemeClr val="bg1"/>
+                </a:solidFill>
+                <a:latin typeface="Calibri" panose="020F0502020204030204" pitchFamily="34" charset="0"/>
+                <a:cs typeface="Calibri" panose="020F0502020204030204" pitchFamily="34" charset="0"/>
+              </a:rPr>
+              <a:t>EarlyStopping</a:t>
+            </a:r>
+            <a:r>
+              <a:rPr lang="en-US" dirty="0">
+                <a:solidFill>
+                  <a:schemeClr val="bg1"/>
+                </a:solidFill>
+                <a:latin typeface="Calibri" panose="020F0502020204030204" pitchFamily="34" charset="0"/>
+                <a:cs typeface="Calibri" panose="020F0502020204030204" pitchFamily="34" charset="0"/>
+              </a:rPr>
+              <a:t>(patience=3, monitor='</a:t>
+            </a:r>
+            <a:r>
+              <a:rPr lang="en-US" dirty="0" err="1">
+                <a:solidFill>
+                  <a:schemeClr val="bg1"/>
+                </a:solidFill>
+                <a:latin typeface="Calibri" panose="020F0502020204030204" pitchFamily="34" charset="0"/>
+                <a:cs typeface="Calibri" panose="020F0502020204030204" pitchFamily="34" charset="0"/>
+              </a:rPr>
+              <a:t>val_loss</a:t>
+            </a:r>
+            <a:r>
+              <a:rPr lang="en-US" dirty="0">
+                <a:solidFill>
+                  <a:schemeClr val="bg1"/>
+                </a:solidFill>
+                <a:latin typeface="Calibri" panose="020F0502020204030204" pitchFamily="34" charset="0"/>
+                <a:cs typeface="Calibri" panose="020F0502020204030204" pitchFamily="34" charset="0"/>
+              </a:rPr>
+              <a:t>’)])</a:t>
+            </a:r>
+          </a:p>
+          <a:p>
+            <a:endParaRPr lang="en-US" dirty="0">
+              <a:solidFill>
+                <a:schemeClr val="bg1"/>
+              </a:solidFill>
+              <a:latin typeface="Calibri" panose="020F0502020204030204" pitchFamily="34" charset="0"/>
+              <a:cs typeface="Calibri" panose="020F0502020204030204" pitchFamily="34" charset="0"/>
+            </a:endParaRPr>
+          </a:p>
+          <a:p>
+            <a:endParaRPr lang="en-US" sz="2400" dirty="0">
+              <a:solidFill>
+                <a:schemeClr val="bg1"/>
+              </a:solidFill>
+              <a:latin typeface="Calibri" panose="020F0502020204030204" pitchFamily="34" charset="0"/>
+              <a:cs typeface="Calibri" panose="020F0502020204030204" pitchFamily="34" charset="0"/>
+            </a:endParaRPr>
           </a:p>
         </p:txBody>
       </p:sp>
     </p:spTree>
     <p:extLst>
       <p:ext uri="{BB962C8B-B14F-4D97-AF65-F5344CB8AC3E}">
-        <p14:creationId xmlns:p14="http://schemas.microsoft.com/office/powerpoint/2010/main" val="1466979490"/>
+        <p14:creationId xmlns:p14="http://schemas.microsoft.com/office/powerpoint/2010/main" val="168876672"/>
       </p:ext>
     </p:extLst>
   </p:cSld>
@@ -9447,7 +10701,7 @@
                   <a:schemeClr val="accent1"/>
                 </a:solidFill>
               </a:rPr>
-              <a:t>Overfitting</a:t>
+              <a:t>Evaluate a model</a:t>
             </a:r>
           </a:p>
         </p:txBody>
@@ -9507,84 +10761,130 @@
           </a:fontRef>
         </p:style>
       </p:cxnSp>
-      <p:pic>
-        <p:nvPicPr>
-          <p:cNvPr id="6" name="Picture 4" descr="Early Stopping">
-            <a:extLst>
-              <a:ext uri="{FF2B5EF4-FFF2-40B4-BE49-F238E27FC236}">
-                <a16:creationId xmlns:a16="http://schemas.microsoft.com/office/drawing/2014/main" id="{17B31C2E-CF72-4FFE-ABE8-05E550E6BC73}"/>
-              </a:ext>
-            </a:extLst>
-          </p:cNvPr>
-          <p:cNvPicPr>
-            <a:picLocks noChangeAspect="1" noChangeArrowheads="1"/>
-          </p:cNvPicPr>
+      <p:sp>
+        <p:nvSpPr>
+          <p:cNvPr id="7" name="Rectangle 6">
+            <a:extLst>
+              <a:ext uri="{FF2B5EF4-FFF2-40B4-BE49-F238E27FC236}">
+                <a16:creationId xmlns:a16="http://schemas.microsoft.com/office/drawing/2014/main" id="{EA66CCA0-77C8-4EF3-B112-6E5919359EFA}"/>
+              </a:ext>
+            </a:extLst>
+          </p:cNvPr>
+          <p:cNvSpPr/>
           <p:nvPr/>
-        </p:nvPicPr>
-        <p:blipFill>
-          <a:blip r:embed="rId3">
-            <a:extLst>
-              <a:ext uri="{28A0092B-C50C-407E-A947-70E740481C1C}">
-                <a14:useLocalDpi xmlns:a14="http://schemas.microsoft.com/office/drawing/2010/main" val="0"/>
-              </a:ext>
-            </a:extLst>
-          </a:blip>
-          <a:srcRect/>
-          <a:stretch>
-            <a:fillRect/>
-          </a:stretch>
-        </p:blipFill>
-        <p:spPr bwMode="auto">
+        </p:nvSpPr>
+        <p:spPr>
           <a:xfrm>
-            <a:off x="4985594" y="1213269"/>
-            <a:ext cx="6553545" cy="3686368"/>
+            <a:off x="5160113" y="1801565"/>
+            <a:ext cx="5687870" cy="2999035"/>
           </a:xfrm>
           <a:prstGeom prst="rect">
             <a:avLst/>
           </a:prstGeom>
-          <a:noFill/>
-          <a:extLst>
-            <a:ext uri="{909E8E84-426E-40DD-AFC4-6F175D3DCCD1}">
-              <a14:hiddenFill xmlns:a14="http://schemas.microsoft.com/office/drawing/2010/main">
-                <a:solidFill>
-                  <a:srgbClr val="FFFFFF"/>
-                </a:solidFill>
-              </a14:hiddenFill>
-            </a:ext>
-          </a:extLst>
         </p:spPr>
-      </p:pic>
-      <p:sp>
-        <p:nvSpPr>
-          <p:cNvPr id="9" name="TextBox 8">
-            <a:extLst>
-              <a:ext uri="{FF2B5EF4-FFF2-40B4-BE49-F238E27FC236}">
-                <a16:creationId xmlns:a16="http://schemas.microsoft.com/office/drawing/2014/main" id="{7D245E57-972B-4D27-89D9-EE9CF0C98ED7}"/>
-              </a:ext>
-            </a:extLst>
-          </p:cNvPr>
-          <p:cNvSpPr txBox="1"/>
-          <p:nvPr/>
-        </p:nvSpPr>
-        <p:spPr>
-          <a:xfrm>
-            <a:off x="6893546" y="4554379"/>
-            <a:ext cx="2236054" cy="246221"/>
-          </a:xfrm>
-          <a:prstGeom prst="rect">
-            <a:avLst/>
-          </a:prstGeom>
-          <a:noFill/>
-        </p:spPr>
-        <p:txBody>
-          <a:bodyPr wrap="square" rtlCol="0">
-            <a:spAutoFit/>
-          </a:bodyPr>
-          <a:lstStyle/>
-          <a:p>
-            <a:r>
-              <a:rPr lang="en-US" sz="1000" dirty="0"/>
-              <a:t>https://deeplearing4j.org/docs</a:t>
+        <p:style>
+          <a:lnRef idx="2">
+            <a:schemeClr val="accent1">
+              <a:shade val="50000"/>
+            </a:schemeClr>
+          </a:lnRef>
+          <a:fillRef idx="1">
+            <a:schemeClr val="accent1"/>
+          </a:fillRef>
+          <a:effectRef idx="0">
+            <a:schemeClr val="accent1"/>
+          </a:effectRef>
+          <a:fontRef idx="minor">
+            <a:schemeClr val="lt1"/>
+          </a:fontRef>
+        </p:style>
+        <p:txBody>
+          <a:bodyPr rtlCol="0" anchor="ctr"/>
+          <a:lstStyle/>
+          <a:p>
+            <a:r>
+              <a:rPr lang="en-US" sz="2000" dirty="0"/>
+              <a:t>score = </a:t>
+            </a:r>
+            <a:r>
+              <a:rPr lang="en-US" sz="2000" dirty="0" err="1"/>
+              <a:t>model.evaluate</a:t>
+            </a:r>
+            <a:r>
+              <a:rPr lang="en-US" sz="2000" dirty="0"/>
+              <a:t>(</a:t>
+            </a:r>
+            <a:r>
+              <a:rPr lang="en-US" sz="2000" dirty="0" err="1"/>
+              <a:t>X_test</a:t>
+            </a:r>
+            <a:r>
+              <a:rPr lang="en-US" sz="2000" dirty="0"/>
+              <a:t>, </a:t>
+            </a:r>
+            <a:r>
+              <a:rPr lang="en-US" sz="2000" dirty="0" err="1"/>
+              <a:t>Y_test</a:t>
+            </a:r>
+            <a:r>
+              <a:rPr lang="en-US" sz="2000" dirty="0"/>
+              <a:t>, verbose=0)  </a:t>
+            </a:r>
+          </a:p>
+          <a:p>
+            <a:endParaRPr lang="en-US" sz="2000" dirty="0"/>
+          </a:p>
+          <a:p>
+            <a:r>
+              <a:rPr lang="en-US" sz="2000" dirty="0"/>
+              <a:t>Print (‘Test score:’, score[0])</a:t>
+            </a:r>
+          </a:p>
+          <a:p>
+            <a:r>
+              <a:rPr lang="en-US" sz="2000" dirty="0"/>
+              <a:t>Print(‘Test accuracy:’, score[1]</a:t>
+            </a:r>
+          </a:p>
+          <a:p>
+            <a:r>
+              <a:rPr lang="en-US" sz="2000" dirty="0"/>
+              <a:t>		</a:t>
+            </a:r>
+            <a:r>
+              <a:rPr lang="en-US" sz="1600" dirty="0"/>
+              <a:t>Test score: 0.14654441912919283</a:t>
+            </a:r>
+          </a:p>
+          <a:p>
+            <a:r>
+              <a:rPr lang="en-US" sz="1600" dirty="0"/>
+              <a:t>		Test accuracy: 0.9574  </a:t>
+            </a:r>
+          </a:p>
+          <a:p>
+            <a:endParaRPr lang="en-US" sz="2000" dirty="0"/>
+          </a:p>
+          <a:p>
+            <a:r>
+              <a:rPr lang="en-US" sz="2000" dirty="0"/>
+              <a:t>Predictions = </a:t>
+            </a:r>
+            <a:r>
+              <a:rPr lang="en-US" sz="2000" dirty="0" err="1"/>
+              <a:t>model.predict</a:t>
+            </a:r>
+            <a:r>
+              <a:rPr lang="en-US" sz="2000" dirty="0"/>
+              <a:t>(</a:t>
+            </a:r>
+            <a:r>
+              <a:rPr lang="en-US" sz="2000" dirty="0" err="1"/>
+              <a:t>new_data</a:t>
+            </a:r>
+            <a:r>
+              <a:rPr lang="en-US" sz="2000" dirty="0"/>
+              <a:t>)</a:t>
             </a:r>
           </a:p>
         </p:txBody>
@@ -9592,7 +10892,7 @@
     </p:spTree>
     <p:extLst>
       <p:ext uri="{BB962C8B-B14F-4D97-AF65-F5344CB8AC3E}">
-        <p14:creationId xmlns:p14="http://schemas.microsoft.com/office/powerpoint/2010/main" val="918747676"/>
+        <p14:creationId xmlns:p14="http://schemas.microsoft.com/office/powerpoint/2010/main" val="1466979490"/>
       </p:ext>
     </p:extLst>
   </p:cSld>

</xml_diff>